<commit_message>
Doc Updated with Intro
</commit_message>
<xml_diff>
--- a/JenkinsTutorial.pptx
+++ b/JenkinsTutorial.pptx
@@ -6,29 +6,30 @@
   </p:sldMasterIdLst>
   <p:sldIdLst>
     <p:sldId id="256" r:id="rId2"/>
-    <p:sldId id="257" r:id="rId3"/>
-    <p:sldId id="258" r:id="rId4"/>
-    <p:sldId id="259" r:id="rId5"/>
-    <p:sldId id="260" r:id="rId6"/>
-    <p:sldId id="261" r:id="rId7"/>
-    <p:sldId id="262" r:id="rId8"/>
-    <p:sldId id="263" r:id="rId9"/>
-    <p:sldId id="264" r:id="rId10"/>
-    <p:sldId id="265" r:id="rId11"/>
-    <p:sldId id="266" r:id="rId12"/>
-    <p:sldId id="267" r:id="rId13"/>
-    <p:sldId id="268" r:id="rId14"/>
-    <p:sldId id="269" r:id="rId15"/>
-    <p:sldId id="270" r:id="rId16"/>
-    <p:sldId id="271" r:id="rId17"/>
-    <p:sldId id="272" r:id="rId18"/>
-    <p:sldId id="273" r:id="rId19"/>
-    <p:sldId id="275" r:id="rId20"/>
-    <p:sldId id="274" r:id="rId21"/>
-    <p:sldId id="276" r:id="rId22"/>
-    <p:sldId id="277" r:id="rId23"/>
-    <p:sldId id="278" r:id="rId24"/>
-    <p:sldId id="279" r:id="rId25"/>
+    <p:sldId id="280" r:id="rId3"/>
+    <p:sldId id="257" r:id="rId4"/>
+    <p:sldId id="258" r:id="rId5"/>
+    <p:sldId id="259" r:id="rId6"/>
+    <p:sldId id="260" r:id="rId7"/>
+    <p:sldId id="261" r:id="rId8"/>
+    <p:sldId id="262" r:id="rId9"/>
+    <p:sldId id="263" r:id="rId10"/>
+    <p:sldId id="264" r:id="rId11"/>
+    <p:sldId id="265" r:id="rId12"/>
+    <p:sldId id="266" r:id="rId13"/>
+    <p:sldId id="267" r:id="rId14"/>
+    <p:sldId id="268" r:id="rId15"/>
+    <p:sldId id="269" r:id="rId16"/>
+    <p:sldId id="270" r:id="rId17"/>
+    <p:sldId id="271" r:id="rId18"/>
+    <p:sldId id="272" r:id="rId19"/>
+    <p:sldId id="273" r:id="rId20"/>
+    <p:sldId id="275" r:id="rId21"/>
+    <p:sldId id="274" r:id="rId22"/>
+    <p:sldId id="276" r:id="rId23"/>
+    <p:sldId id="277" r:id="rId24"/>
+    <p:sldId id="278" r:id="rId25"/>
+    <p:sldId id="279" r:id="rId26"/>
   </p:sldIdLst>
   <p:sldSz cx="12192000" cy="6858000"/>
   <p:notesSz cx="6858000" cy="9144000"/>
@@ -127,6 +128,11 @@
       </a:defRPr>
     </a:lvl9pPr>
   </p:defaultTextStyle>
+  <p:extLst>
+    <p:ext uri="{EFAFB233-063F-42B5-8137-9DF3F51BA10A}">
+      <p15:sldGuideLst xmlns:p15="http://schemas.microsoft.com/office/powerpoint/2012/main"/>
+    </p:ext>
+  </p:extLst>
 </p:presentation>
 </file>
 
@@ -535,7 +541,7 @@
           <a:p>
             <a:fld id="{2994C3F4-F5BD-46AC-8B6A-F4A4D34991A0}" type="datetimeFigureOut">
               <a:rPr lang="en-IN" smtClean="0"/>
-              <a:t>29-04-2019</a:t>
+              <a:t>01-05-2019</a:t>
             </a:fld>
             <a:endParaRPr lang="en-IN"/>
           </a:p>
@@ -714,7 +720,7 @@
           <a:p>
             <a:fld id="{2994C3F4-F5BD-46AC-8B6A-F4A4D34991A0}" type="datetimeFigureOut">
               <a:rPr lang="en-IN" smtClean="0"/>
-              <a:t>29-04-2019</a:t>
+              <a:t>01-05-2019</a:t>
             </a:fld>
             <a:endParaRPr lang="en-IN"/>
           </a:p>
@@ -894,7 +900,7 @@
           <a:p>
             <a:fld id="{2994C3F4-F5BD-46AC-8B6A-F4A4D34991A0}" type="datetimeFigureOut">
               <a:rPr lang="en-IN" smtClean="0"/>
-              <a:t>29-04-2019</a:t>
+              <a:t>01-05-2019</a:t>
             </a:fld>
             <a:endParaRPr lang="en-IN"/>
           </a:p>
@@ -1064,7 +1070,7 @@
           <a:p>
             <a:fld id="{2994C3F4-F5BD-46AC-8B6A-F4A4D34991A0}" type="datetimeFigureOut">
               <a:rPr lang="en-IN" smtClean="0"/>
-              <a:t>29-04-2019</a:t>
+              <a:t>01-05-2019</a:t>
             </a:fld>
             <a:endParaRPr lang="en-IN"/>
           </a:p>
@@ -1389,7 +1395,7 @@
           <a:p>
             <a:fld id="{2994C3F4-F5BD-46AC-8B6A-F4A4D34991A0}" type="datetimeFigureOut">
               <a:rPr lang="en-IN" smtClean="0"/>
-              <a:t>29-04-2019</a:t>
+              <a:t>01-05-2019</a:t>
             </a:fld>
             <a:endParaRPr lang="en-IN"/>
           </a:p>
@@ -1785,7 +1791,7 @@
           <a:p>
             <a:fld id="{2994C3F4-F5BD-46AC-8B6A-F4A4D34991A0}" type="datetimeFigureOut">
               <a:rPr lang="en-IN" smtClean="0"/>
-              <a:t>29-04-2019</a:t>
+              <a:t>01-05-2019</a:t>
             </a:fld>
             <a:endParaRPr lang="en-IN"/>
           </a:p>
@@ -2219,7 +2225,7 @@
           <a:p>
             <a:fld id="{2994C3F4-F5BD-46AC-8B6A-F4A4D34991A0}" type="datetimeFigureOut">
               <a:rPr lang="en-IN" smtClean="0"/>
-              <a:t>29-04-2019</a:t>
+              <a:t>01-05-2019</a:t>
             </a:fld>
             <a:endParaRPr lang="en-IN"/>
           </a:p>
@@ -2337,7 +2343,7 @@
           <a:p>
             <a:fld id="{2994C3F4-F5BD-46AC-8B6A-F4A4D34991A0}" type="datetimeFigureOut">
               <a:rPr lang="en-IN" smtClean="0"/>
-              <a:t>29-04-2019</a:t>
+              <a:t>01-05-2019</a:t>
             </a:fld>
             <a:endParaRPr lang="en-IN"/>
           </a:p>
@@ -2432,7 +2438,7 @@
           <a:p>
             <a:fld id="{2994C3F4-F5BD-46AC-8B6A-F4A4D34991A0}" type="datetimeFigureOut">
               <a:rPr lang="en-IN" smtClean="0"/>
-              <a:t>29-04-2019</a:t>
+              <a:t>01-05-2019</a:t>
             </a:fld>
             <a:endParaRPr lang="en-IN"/>
           </a:p>
@@ -2782,7 +2788,7 @@
           <a:p>
             <a:fld id="{2994C3F4-F5BD-46AC-8B6A-F4A4D34991A0}" type="datetimeFigureOut">
               <a:rPr lang="en-IN" smtClean="0"/>
-              <a:t>29-04-2019</a:t>
+              <a:t>01-05-2019</a:t>
             </a:fld>
             <a:endParaRPr lang="en-IN"/>
           </a:p>
@@ -3217,7 +3223,7 @@
           <a:p>
             <a:fld id="{2994C3F4-F5BD-46AC-8B6A-F4A4D34991A0}" type="datetimeFigureOut">
               <a:rPr lang="en-IN" smtClean="0"/>
-              <a:t>29-04-2019</a:t>
+              <a:t>01-05-2019</a:t>
             </a:fld>
             <a:endParaRPr lang="en-IN"/>
           </a:p>
@@ -3500,7 +3506,7 @@
           <a:p>
             <a:fld id="{2994C3F4-F5BD-46AC-8B6A-F4A4D34991A0}" type="datetimeFigureOut">
               <a:rPr lang="en-IN" smtClean="0"/>
-              <a:t>29-04-2019</a:t>
+              <a:t>01-05-2019</a:t>
             </a:fld>
             <a:endParaRPr lang="en-IN"/>
           </a:p>
@@ -4156,7 +4162,7 @@
           <a:p>
             <a:r>
               <a:rPr lang="en-IN" dirty="0" smtClean="0"/>
-              <a:t>First Job Creation</a:t>
+              <a:t>Empty Dashboard</a:t>
             </a:r>
             <a:endParaRPr lang="en-IN" dirty="0"/>
           </a:p>
@@ -4180,8 +4186,8 @@
         </p:blipFill>
         <p:spPr>
           <a:xfrm>
-            <a:off x="1069848" y="2278063"/>
-            <a:ext cx="7123661" cy="4051300"/>
+            <a:off x="1069848" y="2093976"/>
+            <a:ext cx="4782604" cy="4051300"/>
           </a:xfrm>
           <a:prstGeom prst="rect">
             <a:avLst/>
@@ -4197,14 +4203,14 @@
       </p:pic>
       <p:sp>
         <p:nvSpPr>
-          <p:cNvPr id="6" name="Rectangle 5"/>
+          <p:cNvPr id="5" name="Rectangle 4"/>
           <p:cNvSpPr/>
           <p:nvPr/>
         </p:nvSpPr>
         <p:spPr>
           <a:xfrm>
-            <a:off x="1214439" y="3328989"/>
-            <a:ext cx="6872288" cy="600075"/>
+            <a:off x="3486150" y="3514724"/>
+            <a:ext cx="1757362" cy="310038"/>
           </a:xfrm>
           <a:prstGeom prst="rect">
             <a:avLst/>
@@ -4244,7 +4250,7 @@
     </p:spTree>
     <p:extLst>
       <p:ext uri="{BB962C8B-B14F-4D97-AF65-F5344CB8AC3E}">
-        <p14:creationId xmlns:p14="http://schemas.microsoft.com/office/powerpoint/2010/main" val="652444726"/>
+        <p14:creationId xmlns:p14="http://schemas.microsoft.com/office/powerpoint/2010/main" val="2012299863"/>
       </p:ext>
     </p:extLst>
   </p:cSld>
@@ -4294,12 +4300,8 @@
           <a:lstStyle/>
           <a:p>
             <a:r>
-              <a:rPr lang="en-IN" dirty="0"/>
-              <a:t>First Job </a:t>
-            </a:r>
-            <a:r>
               <a:rPr lang="en-IN" dirty="0" smtClean="0"/>
-              <a:t>Creation - General</a:t>
+              <a:t>First Job Creation</a:t>
             </a:r>
             <a:endParaRPr lang="en-IN" dirty="0"/>
           </a:p>
@@ -4307,7 +4309,7 @@
       </p:sp>
       <p:pic>
         <p:nvPicPr>
-          <p:cNvPr id="7" name="Content Placeholder 6"/>
+          <p:cNvPr id="4" name="Content Placeholder 3"/>
           <p:cNvPicPr>
             <a:picLocks noGrp="1" noChangeAspect="1"/>
           </p:cNvPicPr>
@@ -4323,24 +4325,31 @@
         </p:blipFill>
         <p:spPr>
           <a:xfrm>
-            <a:off x="1069848" y="2093976"/>
-            <a:ext cx="8706179" cy="4051300"/>
+            <a:off x="1069848" y="2278063"/>
+            <a:ext cx="7123661" cy="4051300"/>
           </a:xfrm>
           <a:prstGeom prst="rect">
             <a:avLst/>
           </a:prstGeom>
+          <a:ln>
+            <a:solidFill>
+              <a:schemeClr val="bg1">
+                <a:lumMod val="85000"/>
+              </a:schemeClr>
+            </a:solidFill>
+          </a:ln>
         </p:spPr>
       </p:pic>
       <p:sp>
         <p:nvSpPr>
-          <p:cNvPr id="5" name="Rectangle 4"/>
+          <p:cNvPr id="6" name="Rectangle 5"/>
           <p:cNvSpPr/>
           <p:nvPr/>
         </p:nvSpPr>
         <p:spPr>
           <a:xfrm>
-            <a:off x="2757489" y="4500563"/>
-            <a:ext cx="2185985" cy="357188"/>
+            <a:off x="1214439" y="3328989"/>
+            <a:ext cx="6872288" cy="600075"/>
           </a:xfrm>
           <a:prstGeom prst="rect">
             <a:avLst/>
@@ -4380,7 +4389,7 @@
     </p:spTree>
     <p:extLst>
       <p:ext uri="{BB962C8B-B14F-4D97-AF65-F5344CB8AC3E}">
-        <p14:creationId xmlns:p14="http://schemas.microsoft.com/office/powerpoint/2010/main" val="2336674741"/>
+        <p14:creationId xmlns:p14="http://schemas.microsoft.com/office/powerpoint/2010/main" val="652444726"/>
       </p:ext>
     </p:extLst>
   </p:cSld>
@@ -4431,11 +4440,11 @@
           <a:p>
             <a:r>
               <a:rPr lang="en-IN" dirty="0"/>
-              <a:t>First Job Creation </a:t>
+              <a:t>First Job </a:t>
             </a:r>
             <a:r>
               <a:rPr lang="en-IN" dirty="0" smtClean="0"/>
-              <a:t>– Source Code Management</a:t>
+              <a:t>Creation - General</a:t>
             </a:r>
             <a:endParaRPr lang="en-IN" dirty="0"/>
           </a:p>
@@ -4443,7 +4452,7 @@
       </p:sp>
       <p:pic>
         <p:nvPicPr>
-          <p:cNvPr id="4" name="Content Placeholder 3"/>
+          <p:cNvPr id="7" name="Content Placeholder 6"/>
           <p:cNvPicPr>
             <a:picLocks noGrp="1" noChangeAspect="1"/>
           </p:cNvPicPr>
@@ -4459,19 +4468,12 @@
         </p:blipFill>
         <p:spPr>
           <a:xfrm>
-            <a:off x="1069848" y="2335213"/>
-            <a:ext cx="7254120" cy="4051300"/>
+            <a:off x="1069848" y="2093976"/>
+            <a:ext cx="8706179" cy="4051300"/>
           </a:xfrm>
           <a:prstGeom prst="rect">
             <a:avLst/>
           </a:prstGeom>
-          <a:ln>
-            <a:solidFill>
-              <a:schemeClr val="bg1">
-                <a:lumMod val="85000"/>
-              </a:schemeClr>
-            </a:solidFill>
-          </a:ln>
         </p:spPr>
       </p:pic>
       <p:sp>
@@ -4482,8 +4484,8 @@
         </p:nvSpPr>
         <p:spPr>
           <a:xfrm>
-            <a:off x="3500440" y="3814764"/>
-            <a:ext cx="1843085" cy="271462"/>
+            <a:off x="2757489" y="4500563"/>
+            <a:ext cx="2185985" cy="357188"/>
           </a:xfrm>
           <a:prstGeom prst="rect">
             <a:avLst/>
@@ -4520,56 +4522,10 @@
           </a:p>
         </p:txBody>
       </p:sp>
-      <p:sp>
-        <p:nvSpPr>
-          <p:cNvPr id="6" name="Rectangle 5"/>
-          <p:cNvSpPr/>
-          <p:nvPr/>
-        </p:nvSpPr>
-        <p:spPr>
-          <a:xfrm>
-            <a:off x="4255964" y="5294315"/>
-            <a:ext cx="458912" cy="271462"/>
-          </a:xfrm>
-          <a:prstGeom prst="rect">
-            <a:avLst/>
-          </a:prstGeom>
-          <a:noFill/>
-          <a:ln w="28575">
-            <a:solidFill>
-              <a:srgbClr val="FF0000"/>
-            </a:solidFill>
-          </a:ln>
-        </p:spPr>
-        <p:style>
-          <a:lnRef idx="2">
-            <a:schemeClr val="accent1">
-              <a:shade val="50000"/>
-            </a:schemeClr>
-          </a:lnRef>
-          <a:fillRef idx="1">
-            <a:schemeClr val="accent1"/>
-          </a:fillRef>
-          <a:effectRef idx="0">
-            <a:schemeClr val="accent1"/>
-          </a:effectRef>
-          <a:fontRef idx="minor">
-            <a:schemeClr val="lt1"/>
-          </a:fontRef>
-        </p:style>
-        <p:txBody>
-          <a:bodyPr rtlCol="0" anchor="ctr"/>
-          <a:lstStyle/>
-          <a:p>
-            <a:pPr algn="ctr"/>
-            <a:endParaRPr lang="en-IN"/>
-          </a:p>
-        </p:txBody>
-      </p:sp>
     </p:spTree>
     <p:extLst>
       <p:ext uri="{BB962C8B-B14F-4D97-AF65-F5344CB8AC3E}">
-        <p14:creationId xmlns:p14="http://schemas.microsoft.com/office/powerpoint/2010/main" val="3721187020"/>
+        <p14:creationId xmlns:p14="http://schemas.microsoft.com/office/powerpoint/2010/main" val="2336674741"/>
       </p:ext>
     </p:extLst>
   </p:cSld>
@@ -4619,8 +4575,12 @@
           <a:lstStyle/>
           <a:p>
             <a:r>
+              <a:rPr lang="en-IN" dirty="0"/>
+              <a:t>First Job Creation </a:t>
+            </a:r>
+            <a:r>
               <a:rPr lang="en-IN" dirty="0" smtClean="0"/>
-              <a:t>Dashboard after job creation</a:t>
+              <a:t>– Source Code Management</a:t>
             </a:r>
             <a:endParaRPr lang="en-IN" dirty="0"/>
           </a:p>
@@ -4644,12 +4604,19 @@
         </p:blipFill>
         <p:spPr>
           <a:xfrm>
-            <a:off x="1069848" y="2218700"/>
-            <a:ext cx="10058400" cy="2569825"/>
+            <a:off x="1069848" y="2335213"/>
+            <a:ext cx="7254120" cy="4051300"/>
           </a:xfrm>
           <a:prstGeom prst="rect">
             <a:avLst/>
           </a:prstGeom>
+          <a:ln>
+            <a:solidFill>
+              <a:schemeClr val="bg1">
+                <a:lumMod val="85000"/>
+              </a:schemeClr>
+            </a:solidFill>
+          </a:ln>
         </p:spPr>
       </p:pic>
       <p:sp>
@@ -4660,8 +4627,8 @@
         </p:nvSpPr>
         <p:spPr>
           <a:xfrm>
-            <a:off x="4900616" y="3471864"/>
-            <a:ext cx="800098" cy="228599"/>
+            <a:off x="3500440" y="3814764"/>
+            <a:ext cx="1843085" cy="271462"/>
           </a:xfrm>
           <a:prstGeom prst="rect">
             <a:avLst/>
@@ -4698,10 +4665,56 @@
           </a:p>
         </p:txBody>
       </p:sp>
+      <p:sp>
+        <p:nvSpPr>
+          <p:cNvPr id="6" name="Rectangle 5"/>
+          <p:cNvSpPr/>
+          <p:nvPr/>
+        </p:nvSpPr>
+        <p:spPr>
+          <a:xfrm>
+            <a:off x="4255964" y="5294315"/>
+            <a:ext cx="458912" cy="271462"/>
+          </a:xfrm>
+          <a:prstGeom prst="rect">
+            <a:avLst/>
+          </a:prstGeom>
+          <a:noFill/>
+          <a:ln w="28575">
+            <a:solidFill>
+              <a:srgbClr val="FF0000"/>
+            </a:solidFill>
+          </a:ln>
+        </p:spPr>
+        <p:style>
+          <a:lnRef idx="2">
+            <a:schemeClr val="accent1">
+              <a:shade val="50000"/>
+            </a:schemeClr>
+          </a:lnRef>
+          <a:fillRef idx="1">
+            <a:schemeClr val="accent1"/>
+          </a:fillRef>
+          <a:effectRef idx="0">
+            <a:schemeClr val="accent1"/>
+          </a:effectRef>
+          <a:fontRef idx="minor">
+            <a:schemeClr val="lt1"/>
+          </a:fontRef>
+        </p:style>
+        <p:txBody>
+          <a:bodyPr rtlCol="0" anchor="ctr"/>
+          <a:lstStyle/>
+          <a:p>
+            <a:pPr algn="ctr"/>
+            <a:endParaRPr lang="en-IN"/>
+          </a:p>
+        </p:txBody>
+      </p:sp>
     </p:spTree>
     <p:extLst>
       <p:ext uri="{BB962C8B-B14F-4D97-AF65-F5344CB8AC3E}">
-        <p14:creationId xmlns:p14="http://schemas.microsoft.com/office/powerpoint/2010/main" val="750361707"/>
+        <p14:creationId xmlns:p14="http://schemas.microsoft.com/office/powerpoint/2010/main" val="3721187020"/>
       </p:ext>
     </p:extLst>
   </p:cSld>
@@ -4752,7 +4765,7 @@
           <a:p>
             <a:r>
               <a:rPr lang="en-IN" dirty="0" smtClean="0"/>
-              <a:t>Build Job</a:t>
+              <a:t>Dashboard after job creation</a:t>
             </a:r>
             <a:endParaRPr lang="en-IN" dirty="0"/>
           </a:p>
@@ -4776,19 +4789,12 @@
         </p:blipFill>
         <p:spPr>
           <a:xfrm>
-            <a:off x="1069848" y="2093976"/>
-            <a:ext cx="3590925" cy="3876675"/>
+            <a:off x="1069848" y="2218700"/>
+            <a:ext cx="10058400" cy="2569825"/>
           </a:xfrm>
           <a:prstGeom prst="rect">
             <a:avLst/>
           </a:prstGeom>
-          <a:ln>
-            <a:solidFill>
-              <a:schemeClr val="bg1">
-                <a:lumMod val="85000"/>
-              </a:schemeClr>
-            </a:solidFill>
-          </a:ln>
         </p:spPr>
       </p:pic>
       <p:sp>
@@ -4799,7 +4805,7 @@
         </p:nvSpPr>
         <p:spPr>
           <a:xfrm>
-            <a:off x="1457328" y="2586040"/>
+            <a:off x="4900616" y="3471864"/>
             <a:ext cx="800098" cy="228599"/>
           </a:xfrm>
           <a:prstGeom prst="rect">
@@ -4837,126 +4843,10 @@
           </a:p>
         </p:txBody>
       </p:sp>
-      <p:sp>
-        <p:nvSpPr>
-          <p:cNvPr id="6" name="Rectangle 5"/>
-          <p:cNvSpPr/>
-          <p:nvPr/>
-        </p:nvSpPr>
-        <p:spPr>
-          <a:xfrm>
-            <a:off x="1243013" y="5013010"/>
-            <a:ext cx="3028949" cy="316228"/>
-          </a:xfrm>
-          <a:prstGeom prst="rect">
-            <a:avLst/>
-          </a:prstGeom>
-          <a:noFill/>
-          <a:ln w="28575">
-            <a:solidFill>
-              <a:srgbClr val="FF0000"/>
-            </a:solidFill>
-          </a:ln>
-        </p:spPr>
-        <p:style>
-          <a:lnRef idx="2">
-            <a:schemeClr val="accent1">
-              <a:shade val="50000"/>
-            </a:schemeClr>
-          </a:lnRef>
-          <a:fillRef idx="1">
-            <a:schemeClr val="accent1"/>
-          </a:fillRef>
-          <a:effectRef idx="0">
-            <a:schemeClr val="accent1"/>
-          </a:effectRef>
-          <a:fontRef idx="minor">
-            <a:schemeClr val="lt1"/>
-          </a:fontRef>
-        </p:style>
-        <p:txBody>
-          <a:bodyPr rtlCol="0" anchor="ctr"/>
-          <a:lstStyle/>
-          <a:p>
-            <a:pPr algn="ctr"/>
-            <a:endParaRPr lang="en-IN"/>
-          </a:p>
-        </p:txBody>
-      </p:sp>
-      <p:pic>
-        <p:nvPicPr>
-          <p:cNvPr id="8" name="Picture 7"/>
-          <p:cNvPicPr>
-            <a:picLocks noChangeAspect="1"/>
-          </p:cNvPicPr>
-          <p:nvPr/>
-        </p:nvPicPr>
-        <p:blipFill>
-          <a:blip r:embed="rId3"/>
-          <a:stretch>
-            <a:fillRect/>
-          </a:stretch>
-        </p:blipFill>
-        <p:spPr>
-          <a:xfrm>
-            <a:off x="5048253" y="2093976"/>
-            <a:ext cx="6370643" cy="2624136"/>
-          </a:xfrm>
-          <a:prstGeom prst="rect">
-            <a:avLst/>
-          </a:prstGeom>
-        </p:spPr>
-      </p:pic>
-      <p:sp>
-        <p:nvSpPr>
-          <p:cNvPr id="9" name="Rectangle 8"/>
-          <p:cNvSpPr/>
-          <p:nvPr/>
-        </p:nvSpPr>
-        <p:spPr>
-          <a:xfrm>
-            <a:off x="7962113" y="3315510"/>
-            <a:ext cx="800098" cy="775620"/>
-          </a:xfrm>
-          <a:prstGeom prst="rect">
-            <a:avLst/>
-          </a:prstGeom>
-          <a:noFill/>
-          <a:ln w="28575">
-            <a:solidFill>
-              <a:srgbClr val="FF0000"/>
-            </a:solidFill>
-          </a:ln>
-        </p:spPr>
-        <p:style>
-          <a:lnRef idx="2">
-            <a:schemeClr val="accent1">
-              <a:shade val="50000"/>
-            </a:schemeClr>
-          </a:lnRef>
-          <a:fillRef idx="1">
-            <a:schemeClr val="accent1"/>
-          </a:fillRef>
-          <a:effectRef idx="0">
-            <a:schemeClr val="accent1"/>
-          </a:effectRef>
-          <a:fontRef idx="minor">
-            <a:schemeClr val="lt1"/>
-          </a:fontRef>
-        </p:style>
-        <p:txBody>
-          <a:bodyPr rtlCol="0" anchor="ctr"/>
-          <a:lstStyle/>
-          <a:p>
-            <a:pPr algn="ctr"/>
-            <a:endParaRPr lang="en-IN"/>
-          </a:p>
-        </p:txBody>
-      </p:sp>
     </p:spTree>
     <p:extLst>
       <p:ext uri="{BB962C8B-B14F-4D97-AF65-F5344CB8AC3E}">
-        <p14:creationId xmlns:p14="http://schemas.microsoft.com/office/powerpoint/2010/main" val="3736806201"/>
+        <p14:creationId xmlns:p14="http://schemas.microsoft.com/office/powerpoint/2010/main" val="750361707"/>
       </p:ext>
     </p:extLst>
   </p:cSld>
@@ -5007,7 +4897,7 @@
           <a:p>
             <a:r>
               <a:rPr lang="en-IN" dirty="0" smtClean="0"/>
-              <a:t>Build Console Output</a:t>
+              <a:t>Build Job</a:t>
             </a:r>
             <a:endParaRPr lang="en-IN" dirty="0"/>
           </a:p>
@@ -5032,7 +4922,7 @@
         <p:spPr>
           <a:xfrm>
             <a:off x="1069848" y="2093976"/>
-            <a:ext cx="10058400" cy="3936252"/>
+            <a:ext cx="3590925" cy="3876675"/>
           </a:xfrm>
           <a:prstGeom prst="rect">
             <a:avLst/>
@@ -5054,8 +4944,8 @@
         </p:nvSpPr>
         <p:spPr>
           <a:xfrm>
-            <a:off x="2586040" y="2093977"/>
-            <a:ext cx="228598" cy="206312"/>
+            <a:off x="1457328" y="2586040"/>
+            <a:ext cx="800098" cy="228599"/>
           </a:xfrm>
           <a:prstGeom prst="rect">
             <a:avLst/>
@@ -5100,8 +4990,8 @@
         </p:nvSpPr>
         <p:spPr>
           <a:xfrm>
-            <a:off x="1238252" y="3468432"/>
-            <a:ext cx="1347788" cy="206312"/>
+            <a:off x="1243013" y="5013010"/>
+            <a:ext cx="3028949" cy="316228"/>
           </a:xfrm>
           <a:prstGeom prst="rect">
             <a:avLst/>
@@ -5138,16 +5028,40 @@
           </a:p>
         </p:txBody>
       </p:sp>
-      <p:sp>
-        <p:nvSpPr>
-          <p:cNvPr id="7" name="Rectangle 6"/>
+      <p:pic>
+        <p:nvPicPr>
+          <p:cNvPr id="8" name="Picture 7"/>
+          <p:cNvPicPr>
+            <a:picLocks noChangeAspect="1"/>
+          </p:cNvPicPr>
+          <p:nvPr/>
+        </p:nvPicPr>
+        <p:blipFill>
+          <a:blip r:embed="rId3"/>
+          <a:stretch>
+            <a:fillRect/>
+          </a:stretch>
+        </p:blipFill>
+        <p:spPr>
+          <a:xfrm>
+            <a:off x="5048253" y="2093976"/>
+            <a:ext cx="6370643" cy="2624136"/>
+          </a:xfrm>
+          <a:prstGeom prst="rect">
+            <a:avLst/>
+          </a:prstGeom>
+        </p:spPr>
+      </p:pic>
+      <p:sp>
+        <p:nvSpPr>
+          <p:cNvPr id="9" name="Rectangle 8"/>
           <p:cNvSpPr/>
           <p:nvPr/>
         </p:nvSpPr>
         <p:spPr>
           <a:xfrm>
-            <a:off x="4065072" y="5463918"/>
-            <a:ext cx="1113875" cy="206312"/>
+            <a:off x="7962113" y="3315510"/>
+            <a:ext cx="800098" cy="775620"/>
           </a:xfrm>
           <a:prstGeom prst="rect">
             <a:avLst/>
@@ -5187,7 +5101,7 @@
     </p:spTree>
     <p:extLst>
       <p:ext uri="{BB962C8B-B14F-4D97-AF65-F5344CB8AC3E}">
-        <p14:creationId xmlns:p14="http://schemas.microsoft.com/office/powerpoint/2010/main" val="3862671418"/>
+        <p14:creationId xmlns:p14="http://schemas.microsoft.com/office/powerpoint/2010/main" val="3736806201"/>
       </p:ext>
     </p:extLst>
   </p:cSld>
@@ -5238,7 +5152,7 @@
           <a:p>
             <a:r>
               <a:rPr lang="en-IN" dirty="0" smtClean="0"/>
-              <a:t>Continuous Deployment</a:t>
+              <a:t>Build Console Output</a:t>
             </a:r>
             <a:endParaRPr lang="en-IN" dirty="0"/>
           </a:p>
@@ -5262,24 +5176,176 @@
         </p:blipFill>
         <p:spPr>
           <a:xfrm>
-            <a:off x="1069848" y="2322576"/>
-            <a:ext cx="8114747" cy="4051300"/>
+            <a:off x="1069848" y="2093976"/>
+            <a:ext cx="10058400" cy="3936252"/>
           </a:xfrm>
           <a:prstGeom prst="rect">
             <a:avLst/>
           </a:prstGeom>
+          <a:ln>
+            <a:solidFill>
+              <a:schemeClr val="bg1">
+                <a:lumMod val="85000"/>
+              </a:schemeClr>
+            </a:solidFill>
+          </a:ln>
         </p:spPr>
       </p:pic>
+      <p:sp>
+        <p:nvSpPr>
+          <p:cNvPr id="5" name="Rectangle 4"/>
+          <p:cNvSpPr/>
+          <p:nvPr/>
+        </p:nvSpPr>
+        <p:spPr>
+          <a:xfrm>
+            <a:off x="2586040" y="2093977"/>
+            <a:ext cx="228598" cy="206312"/>
+          </a:xfrm>
+          <a:prstGeom prst="rect">
+            <a:avLst/>
+          </a:prstGeom>
+          <a:noFill/>
+          <a:ln w="28575">
+            <a:solidFill>
+              <a:srgbClr val="FF0000"/>
+            </a:solidFill>
+          </a:ln>
+        </p:spPr>
+        <p:style>
+          <a:lnRef idx="2">
+            <a:schemeClr val="accent1">
+              <a:shade val="50000"/>
+            </a:schemeClr>
+          </a:lnRef>
+          <a:fillRef idx="1">
+            <a:schemeClr val="accent1"/>
+          </a:fillRef>
+          <a:effectRef idx="0">
+            <a:schemeClr val="accent1"/>
+          </a:effectRef>
+          <a:fontRef idx="minor">
+            <a:schemeClr val="lt1"/>
+          </a:fontRef>
+        </p:style>
+        <p:txBody>
+          <a:bodyPr rtlCol="0" anchor="ctr"/>
+          <a:lstStyle/>
+          <a:p>
+            <a:pPr algn="ctr"/>
+            <a:endParaRPr lang="en-IN"/>
+          </a:p>
+        </p:txBody>
+      </p:sp>
+      <p:sp>
+        <p:nvSpPr>
+          <p:cNvPr id="6" name="Rectangle 5"/>
+          <p:cNvSpPr/>
+          <p:nvPr/>
+        </p:nvSpPr>
+        <p:spPr>
+          <a:xfrm>
+            <a:off x="1238252" y="3468432"/>
+            <a:ext cx="1347788" cy="206312"/>
+          </a:xfrm>
+          <a:prstGeom prst="rect">
+            <a:avLst/>
+          </a:prstGeom>
+          <a:noFill/>
+          <a:ln w="28575">
+            <a:solidFill>
+              <a:srgbClr val="FF0000"/>
+            </a:solidFill>
+          </a:ln>
+        </p:spPr>
+        <p:style>
+          <a:lnRef idx="2">
+            <a:schemeClr val="accent1">
+              <a:shade val="50000"/>
+            </a:schemeClr>
+          </a:lnRef>
+          <a:fillRef idx="1">
+            <a:schemeClr val="accent1"/>
+          </a:fillRef>
+          <a:effectRef idx="0">
+            <a:schemeClr val="accent1"/>
+          </a:effectRef>
+          <a:fontRef idx="minor">
+            <a:schemeClr val="lt1"/>
+          </a:fontRef>
+        </p:style>
+        <p:txBody>
+          <a:bodyPr rtlCol="0" anchor="ctr"/>
+          <a:lstStyle/>
+          <a:p>
+            <a:pPr algn="ctr"/>
+            <a:endParaRPr lang="en-IN"/>
+          </a:p>
+        </p:txBody>
+      </p:sp>
+      <p:sp>
+        <p:nvSpPr>
+          <p:cNvPr id="7" name="Rectangle 6"/>
+          <p:cNvSpPr/>
+          <p:nvPr/>
+        </p:nvSpPr>
+        <p:spPr>
+          <a:xfrm>
+            <a:off x="4065072" y="5463918"/>
+            <a:ext cx="1113875" cy="206312"/>
+          </a:xfrm>
+          <a:prstGeom prst="rect">
+            <a:avLst/>
+          </a:prstGeom>
+          <a:noFill/>
+          <a:ln w="28575">
+            <a:solidFill>
+              <a:srgbClr val="FF0000"/>
+            </a:solidFill>
+          </a:ln>
+        </p:spPr>
+        <p:style>
+          <a:lnRef idx="2">
+            <a:schemeClr val="accent1">
+              <a:shade val="50000"/>
+            </a:schemeClr>
+          </a:lnRef>
+          <a:fillRef idx="1">
+            <a:schemeClr val="accent1"/>
+          </a:fillRef>
+          <a:effectRef idx="0">
+            <a:schemeClr val="accent1"/>
+          </a:effectRef>
+          <a:fontRef idx="minor">
+            <a:schemeClr val="lt1"/>
+          </a:fontRef>
+        </p:style>
+        <p:txBody>
+          <a:bodyPr rtlCol="0" anchor="ctr"/>
+          <a:lstStyle/>
+          <a:p>
+            <a:pPr algn="ctr"/>
+            <a:endParaRPr lang="en-IN"/>
+          </a:p>
+        </p:txBody>
+      </p:sp>
     </p:spTree>
     <p:extLst>
       <p:ext uri="{BB962C8B-B14F-4D97-AF65-F5344CB8AC3E}">
-        <p14:creationId xmlns:p14="http://schemas.microsoft.com/office/powerpoint/2010/main" val="1348554796"/>
+        <p14:creationId xmlns:p14="http://schemas.microsoft.com/office/powerpoint/2010/main" val="3862671418"/>
       </p:ext>
     </p:extLst>
   </p:cSld>
   <p:clrMapOvr>
     <a:masterClrMapping/>
   </p:clrMapOvr>
+  <p:timing>
+    <p:tnLst>
+      <p:par>
+        <p:cTn id="1" dur="indefinite" restart="never" nodeType="tmRoot"/>
+      </p:par>
+    </p:tnLst>
+  </p:timing>
 </p:sld>
 </file>
 
@@ -5317,7 +5383,7 @@
           <a:p>
             <a:r>
               <a:rPr lang="en-IN" dirty="0" smtClean="0"/>
-              <a:t>Install Plugins</a:t>
+              <a:t>Continuous Deployment</a:t>
             </a:r>
             <a:endParaRPr lang="en-IN" dirty="0"/>
           </a:p>
@@ -5341,110 +5407,18 @@
         </p:blipFill>
         <p:spPr>
           <a:xfrm>
-            <a:off x="1102046" y="2120900"/>
-            <a:ext cx="9994257" cy="4051300"/>
+            <a:off x="1069848" y="2322576"/>
+            <a:ext cx="8114747" cy="4051300"/>
           </a:xfrm>
           <a:prstGeom prst="rect">
             <a:avLst/>
           </a:prstGeom>
         </p:spPr>
       </p:pic>
-      <p:sp>
-        <p:nvSpPr>
-          <p:cNvPr id="5" name="Rectangle 4"/>
-          <p:cNvSpPr/>
-          <p:nvPr/>
-        </p:nvSpPr>
-        <p:spPr>
-          <a:xfrm>
-            <a:off x="1117792" y="2424652"/>
-            <a:ext cx="1225263" cy="226943"/>
-          </a:xfrm>
-          <a:prstGeom prst="rect">
-            <a:avLst/>
-          </a:prstGeom>
-          <a:noFill/>
-          <a:ln w="28575">
-            <a:solidFill>
-              <a:srgbClr val="FF0000"/>
-            </a:solidFill>
-          </a:ln>
-        </p:spPr>
-        <p:style>
-          <a:lnRef idx="2">
-            <a:schemeClr val="accent1">
-              <a:shade val="50000"/>
-            </a:schemeClr>
-          </a:lnRef>
-          <a:fillRef idx="1">
-            <a:schemeClr val="accent1"/>
-          </a:fillRef>
-          <a:effectRef idx="0">
-            <a:schemeClr val="accent1"/>
-          </a:effectRef>
-          <a:fontRef idx="minor">
-            <a:schemeClr val="lt1"/>
-          </a:fontRef>
-        </p:style>
-        <p:txBody>
-          <a:bodyPr rtlCol="0" anchor="ctr"/>
-          <a:lstStyle/>
-          <a:p>
-            <a:pPr algn="ctr"/>
-            <a:endParaRPr lang="en-IN"/>
-          </a:p>
-        </p:txBody>
-      </p:sp>
-      <p:sp>
-        <p:nvSpPr>
-          <p:cNvPr id="6" name="Rectangle 5"/>
-          <p:cNvSpPr/>
-          <p:nvPr/>
-        </p:nvSpPr>
-        <p:spPr>
-          <a:xfrm>
-            <a:off x="3984817" y="5091652"/>
-            <a:ext cx="4873433" cy="451898"/>
-          </a:xfrm>
-          <a:prstGeom prst="rect">
-            <a:avLst/>
-          </a:prstGeom>
-          <a:noFill/>
-          <a:ln w="28575">
-            <a:solidFill>
-              <a:srgbClr val="FF0000"/>
-            </a:solidFill>
-          </a:ln>
-        </p:spPr>
-        <p:style>
-          <a:lnRef idx="2">
-            <a:schemeClr val="accent1">
-              <a:shade val="50000"/>
-            </a:schemeClr>
-          </a:lnRef>
-          <a:fillRef idx="1">
-            <a:schemeClr val="accent1"/>
-          </a:fillRef>
-          <a:effectRef idx="0">
-            <a:schemeClr val="accent1"/>
-          </a:effectRef>
-          <a:fontRef idx="minor">
-            <a:schemeClr val="lt1"/>
-          </a:fontRef>
-        </p:style>
-        <p:txBody>
-          <a:bodyPr rtlCol="0" anchor="ctr"/>
-          <a:lstStyle/>
-          <a:p>
-            <a:pPr algn="ctr"/>
-            <a:endParaRPr lang="en-IN"/>
-          </a:p>
-        </p:txBody>
-      </p:sp>
     </p:spTree>
     <p:extLst>
       <p:ext uri="{BB962C8B-B14F-4D97-AF65-F5344CB8AC3E}">
-        <p14:creationId xmlns:p14="http://schemas.microsoft.com/office/powerpoint/2010/main" val="2416744450"/>
+        <p14:creationId xmlns:p14="http://schemas.microsoft.com/office/powerpoint/2010/main" val="1348554796"/>
       </p:ext>
     </p:extLst>
   </p:cSld>
@@ -5488,7 +5462,7 @@
           <a:p>
             <a:r>
               <a:rPr lang="en-IN" dirty="0" smtClean="0"/>
-              <a:t>Select Plugin</a:t>
+              <a:t>Install Plugins</a:t>
             </a:r>
             <a:endParaRPr lang="en-IN" dirty="0"/>
           </a:p>
@@ -5512,19 +5486,12 @@
         </p:blipFill>
         <p:spPr>
           <a:xfrm>
-            <a:off x="1069848" y="2335212"/>
-            <a:ext cx="9005930" cy="4051300"/>
+            <a:off x="1102046" y="2120900"/>
+            <a:ext cx="9994257" cy="4051300"/>
           </a:xfrm>
           <a:prstGeom prst="rect">
             <a:avLst/>
           </a:prstGeom>
-          <a:ln>
-            <a:solidFill>
-              <a:schemeClr val="bg1">
-                <a:lumMod val="85000"/>
-              </a:schemeClr>
-            </a:solidFill>
-          </a:ln>
         </p:spPr>
       </p:pic>
       <p:sp>
@@ -5535,8 +5502,8 @@
         </p:nvSpPr>
         <p:spPr>
           <a:xfrm>
-            <a:off x="4911618" y="3553363"/>
-            <a:ext cx="724303" cy="232824"/>
+            <a:off x="1117792" y="2424652"/>
+            <a:ext cx="1225263" cy="226943"/>
           </a:xfrm>
           <a:prstGeom prst="rect">
             <a:avLst/>
@@ -5581,8 +5548,8 @@
         </p:nvSpPr>
         <p:spPr>
           <a:xfrm>
-            <a:off x="8093162" y="3177126"/>
-            <a:ext cx="1552608" cy="232824"/>
+            <a:off x="3984817" y="5091652"/>
+            <a:ext cx="4873433" cy="451898"/>
           </a:xfrm>
           <a:prstGeom prst="rect">
             <a:avLst/>
@@ -5619,102 +5586,10 @@
           </a:p>
         </p:txBody>
       </p:sp>
-      <p:sp>
-        <p:nvSpPr>
-          <p:cNvPr id="7" name="Rectangle 6"/>
-          <p:cNvSpPr/>
-          <p:nvPr/>
-        </p:nvSpPr>
-        <p:spPr>
-          <a:xfrm>
-            <a:off x="4546440" y="4113749"/>
-            <a:ext cx="4711860" cy="601125"/>
-          </a:xfrm>
-          <a:prstGeom prst="rect">
-            <a:avLst/>
-          </a:prstGeom>
-          <a:noFill/>
-          <a:ln w="28575">
-            <a:solidFill>
-              <a:srgbClr val="FF0000"/>
-            </a:solidFill>
-          </a:ln>
-        </p:spPr>
-        <p:style>
-          <a:lnRef idx="2">
-            <a:schemeClr val="accent1">
-              <a:shade val="50000"/>
-            </a:schemeClr>
-          </a:lnRef>
-          <a:fillRef idx="1">
-            <a:schemeClr val="accent1"/>
-          </a:fillRef>
-          <a:effectRef idx="0">
-            <a:schemeClr val="accent1"/>
-          </a:effectRef>
-          <a:fontRef idx="minor">
-            <a:schemeClr val="lt1"/>
-          </a:fontRef>
-        </p:style>
-        <p:txBody>
-          <a:bodyPr rtlCol="0" anchor="ctr"/>
-          <a:lstStyle/>
-          <a:p>
-            <a:pPr algn="ctr"/>
-            <a:endParaRPr lang="en-IN"/>
-          </a:p>
-        </p:txBody>
-      </p:sp>
-      <p:sp>
-        <p:nvSpPr>
-          <p:cNvPr id="8" name="Rectangle 7"/>
-          <p:cNvSpPr/>
-          <p:nvPr/>
-        </p:nvSpPr>
-        <p:spPr>
-          <a:xfrm>
-            <a:off x="5949843" y="5806027"/>
-            <a:ext cx="2536932" cy="480474"/>
-          </a:xfrm>
-          <a:prstGeom prst="rect">
-            <a:avLst/>
-          </a:prstGeom>
-          <a:noFill/>
-          <a:ln w="28575">
-            <a:solidFill>
-              <a:srgbClr val="FF0000"/>
-            </a:solidFill>
-          </a:ln>
-        </p:spPr>
-        <p:style>
-          <a:lnRef idx="2">
-            <a:schemeClr val="accent1">
-              <a:shade val="50000"/>
-            </a:schemeClr>
-          </a:lnRef>
-          <a:fillRef idx="1">
-            <a:schemeClr val="accent1"/>
-          </a:fillRef>
-          <a:effectRef idx="0">
-            <a:schemeClr val="accent1"/>
-          </a:effectRef>
-          <a:fontRef idx="minor">
-            <a:schemeClr val="lt1"/>
-          </a:fontRef>
-        </p:style>
-        <p:txBody>
-          <a:bodyPr rtlCol="0" anchor="ctr"/>
-          <a:lstStyle/>
-          <a:p>
-            <a:pPr algn="ctr"/>
-            <a:endParaRPr lang="en-IN"/>
-          </a:p>
-        </p:txBody>
-      </p:sp>
     </p:spTree>
     <p:extLst>
       <p:ext uri="{BB962C8B-B14F-4D97-AF65-F5344CB8AC3E}">
-        <p14:creationId xmlns:p14="http://schemas.microsoft.com/office/powerpoint/2010/main" val="2397796797"/>
+        <p14:creationId xmlns:p14="http://schemas.microsoft.com/office/powerpoint/2010/main" val="2416744450"/>
       </p:ext>
     </p:extLst>
   </p:cSld>
@@ -5743,7 +5618,7 @@
       </p:grpSpPr>
       <p:sp>
         <p:nvSpPr>
-          <p:cNvPr id="4" name="Title 3"/>
+          <p:cNvPr id="2" name="Title 1"/>
           <p:cNvSpPr>
             <a:spLocks noGrp="1"/>
           </p:cNvSpPr>
@@ -5758,27 +5633,225 @@
           <a:p>
             <a:r>
               <a:rPr lang="en-IN" dirty="0" smtClean="0"/>
-              <a:t>Create a Build job in Jenkins</a:t>
+              <a:t>Select Plugin</a:t>
             </a:r>
             <a:endParaRPr lang="en-IN" dirty="0"/>
           </a:p>
         </p:txBody>
       </p:sp>
-      <p:sp>
-        <p:nvSpPr>
-          <p:cNvPr id="5" name="Text Placeholder 4"/>
-          <p:cNvSpPr>
-            <a:spLocks noGrp="1"/>
-          </p:cNvSpPr>
-          <p:nvPr>
-            <p:ph type="body" idx="1"/>
-          </p:nvPr>
-        </p:nvSpPr>
-        <p:spPr/>
-        <p:txBody>
-          <a:bodyPr/>
-          <a:lstStyle/>
-          <a:p>
+      <p:pic>
+        <p:nvPicPr>
+          <p:cNvPr id="4" name="Content Placeholder 3"/>
+          <p:cNvPicPr>
+            <a:picLocks noGrp="1" noChangeAspect="1"/>
+          </p:cNvPicPr>
+          <p:nvPr>
+            <p:ph idx="1"/>
+          </p:nvPr>
+        </p:nvPicPr>
+        <p:blipFill>
+          <a:blip r:embed="rId2"/>
+          <a:stretch>
+            <a:fillRect/>
+          </a:stretch>
+        </p:blipFill>
+        <p:spPr>
+          <a:xfrm>
+            <a:off x="1069848" y="2335212"/>
+            <a:ext cx="9005930" cy="4051300"/>
+          </a:xfrm>
+          <a:prstGeom prst="rect">
+            <a:avLst/>
+          </a:prstGeom>
+          <a:ln>
+            <a:solidFill>
+              <a:schemeClr val="bg1">
+                <a:lumMod val="85000"/>
+              </a:schemeClr>
+            </a:solidFill>
+          </a:ln>
+        </p:spPr>
+      </p:pic>
+      <p:sp>
+        <p:nvSpPr>
+          <p:cNvPr id="5" name="Rectangle 4"/>
+          <p:cNvSpPr/>
+          <p:nvPr/>
+        </p:nvSpPr>
+        <p:spPr>
+          <a:xfrm>
+            <a:off x="4911618" y="3553363"/>
+            <a:ext cx="724303" cy="232824"/>
+          </a:xfrm>
+          <a:prstGeom prst="rect">
+            <a:avLst/>
+          </a:prstGeom>
+          <a:noFill/>
+          <a:ln w="28575">
+            <a:solidFill>
+              <a:srgbClr val="FF0000"/>
+            </a:solidFill>
+          </a:ln>
+        </p:spPr>
+        <p:style>
+          <a:lnRef idx="2">
+            <a:schemeClr val="accent1">
+              <a:shade val="50000"/>
+            </a:schemeClr>
+          </a:lnRef>
+          <a:fillRef idx="1">
+            <a:schemeClr val="accent1"/>
+          </a:fillRef>
+          <a:effectRef idx="0">
+            <a:schemeClr val="accent1"/>
+          </a:effectRef>
+          <a:fontRef idx="minor">
+            <a:schemeClr val="lt1"/>
+          </a:fontRef>
+        </p:style>
+        <p:txBody>
+          <a:bodyPr rtlCol="0" anchor="ctr"/>
+          <a:lstStyle/>
+          <a:p>
+            <a:pPr algn="ctr"/>
+            <a:endParaRPr lang="en-IN"/>
+          </a:p>
+        </p:txBody>
+      </p:sp>
+      <p:sp>
+        <p:nvSpPr>
+          <p:cNvPr id="6" name="Rectangle 5"/>
+          <p:cNvSpPr/>
+          <p:nvPr/>
+        </p:nvSpPr>
+        <p:spPr>
+          <a:xfrm>
+            <a:off x="8093162" y="3177126"/>
+            <a:ext cx="1552608" cy="232824"/>
+          </a:xfrm>
+          <a:prstGeom prst="rect">
+            <a:avLst/>
+          </a:prstGeom>
+          <a:noFill/>
+          <a:ln w="28575">
+            <a:solidFill>
+              <a:srgbClr val="FF0000"/>
+            </a:solidFill>
+          </a:ln>
+        </p:spPr>
+        <p:style>
+          <a:lnRef idx="2">
+            <a:schemeClr val="accent1">
+              <a:shade val="50000"/>
+            </a:schemeClr>
+          </a:lnRef>
+          <a:fillRef idx="1">
+            <a:schemeClr val="accent1"/>
+          </a:fillRef>
+          <a:effectRef idx="0">
+            <a:schemeClr val="accent1"/>
+          </a:effectRef>
+          <a:fontRef idx="minor">
+            <a:schemeClr val="lt1"/>
+          </a:fontRef>
+        </p:style>
+        <p:txBody>
+          <a:bodyPr rtlCol="0" anchor="ctr"/>
+          <a:lstStyle/>
+          <a:p>
+            <a:pPr algn="ctr"/>
+            <a:endParaRPr lang="en-IN"/>
+          </a:p>
+        </p:txBody>
+      </p:sp>
+      <p:sp>
+        <p:nvSpPr>
+          <p:cNvPr id="7" name="Rectangle 6"/>
+          <p:cNvSpPr/>
+          <p:nvPr/>
+        </p:nvSpPr>
+        <p:spPr>
+          <a:xfrm>
+            <a:off x="4546440" y="4113749"/>
+            <a:ext cx="4711860" cy="601125"/>
+          </a:xfrm>
+          <a:prstGeom prst="rect">
+            <a:avLst/>
+          </a:prstGeom>
+          <a:noFill/>
+          <a:ln w="28575">
+            <a:solidFill>
+              <a:srgbClr val="FF0000"/>
+            </a:solidFill>
+          </a:ln>
+        </p:spPr>
+        <p:style>
+          <a:lnRef idx="2">
+            <a:schemeClr val="accent1">
+              <a:shade val="50000"/>
+            </a:schemeClr>
+          </a:lnRef>
+          <a:fillRef idx="1">
+            <a:schemeClr val="accent1"/>
+          </a:fillRef>
+          <a:effectRef idx="0">
+            <a:schemeClr val="accent1"/>
+          </a:effectRef>
+          <a:fontRef idx="minor">
+            <a:schemeClr val="lt1"/>
+          </a:fontRef>
+        </p:style>
+        <p:txBody>
+          <a:bodyPr rtlCol="0" anchor="ctr"/>
+          <a:lstStyle/>
+          <a:p>
+            <a:pPr algn="ctr"/>
+            <a:endParaRPr lang="en-IN"/>
+          </a:p>
+        </p:txBody>
+      </p:sp>
+      <p:sp>
+        <p:nvSpPr>
+          <p:cNvPr id="8" name="Rectangle 7"/>
+          <p:cNvSpPr/>
+          <p:nvPr/>
+        </p:nvSpPr>
+        <p:spPr>
+          <a:xfrm>
+            <a:off x="5949843" y="5806027"/>
+            <a:ext cx="2536932" cy="480474"/>
+          </a:xfrm>
+          <a:prstGeom prst="rect">
+            <a:avLst/>
+          </a:prstGeom>
+          <a:noFill/>
+          <a:ln w="28575">
+            <a:solidFill>
+              <a:srgbClr val="FF0000"/>
+            </a:solidFill>
+          </a:ln>
+        </p:spPr>
+        <p:style>
+          <a:lnRef idx="2">
+            <a:schemeClr val="accent1">
+              <a:shade val="50000"/>
+            </a:schemeClr>
+          </a:lnRef>
+          <a:fillRef idx="1">
+            <a:schemeClr val="accent1"/>
+          </a:fillRef>
+          <a:effectRef idx="0">
+            <a:schemeClr val="accent1"/>
+          </a:effectRef>
+          <a:fontRef idx="minor">
+            <a:schemeClr val="lt1"/>
+          </a:fontRef>
+        </p:style>
+        <p:txBody>
+          <a:bodyPr rtlCol="0" anchor="ctr"/>
+          <a:lstStyle/>
+          <a:p>
+            <a:pPr algn="ctr"/>
             <a:endParaRPr lang="en-IN"/>
           </a:p>
         </p:txBody>
@@ -5786,7 +5859,7 @@
     </p:spTree>
     <p:extLst>
       <p:ext uri="{BB962C8B-B14F-4D97-AF65-F5344CB8AC3E}">
-        <p14:creationId xmlns:p14="http://schemas.microsoft.com/office/powerpoint/2010/main" val="2787435255"/>
+        <p14:creationId xmlns:p14="http://schemas.microsoft.com/office/powerpoint/2010/main" val="2397796797"/>
       </p:ext>
     </p:extLst>
   </p:cSld>
@@ -5815,7 +5888,7 @@
       </p:grpSpPr>
       <p:sp>
         <p:nvSpPr>
-          <p:cNvPr id="4" name="Title 3"/>
+          <p:cNvPr id="2" name="Title 1"/>
           <p:cNvSpPr>
             <a:spLocks noGrp="1"/>
           </p:cNvSpPr>
@@ -5830,7 +5903,7 @@
           <a:p>
             <a:r>
               <a:rPr lang="en-IN" dirty="0" smtClean="0"/>
-              <a:t>Installation</a:t>
+              <a:t>INTRODUCTION</a:t>
             </a:r>
             <a:endParaRPr lang="en-IN" dirty="0"/>
           </a:p>
@@ -5838,40 +5911,71 @@
       </p:sp>
       <p:sp>
         <p:nvSpPr>
-          <p:cNvPr id="5" name="Text Placeholder 4"/>
-          <p:cNvSpPr>
-            <a:spLocks noGrp="1"/>
-          </p:cNvSpPr>
-          <p:nvPr>
-            <p:ph type="body" idx="1"/>
+          <p:cNvPr id="3" name="Content Placeholder 2"/>
+          <p:cNvSpPr>
+            <a:spLocks noGrp="1"/>
+          </p:cNvSpPr>
+          <p:nvPr>
+            <p:ph idx="1"/>
           </p:nvPr>
         </p:nvSpPr>
         <p:spPr/>
         <p:txBody>
-          <a:bodyPr/>
-          <a:lstStyle/>
-          <a:p>
-            <a:endParaRPr lang="en-IN"/>
+          <a:bodyPr>
+            <a:normAutofit/>
+          </a:bodyPr>
+          <a:lstStyle/>
+          <a:p>
+            <a:pPr marL="357188" indent="-357188"/>
+            <a:r>
+              <a:rPr lang="en-IN" sz="2400" dirty="0"/>
+              <a:t>Jenkins is a powerful application that allows continuous integration and continuous delivery of </a:t>
+            </a:r>
+            <a:r>
+              <a:rPr lang="en-IN" sz="2400" dirty="0" smtClean="0"/>
+              <a:t>projects. </a:t>
+            </a:r>
+          </a:p>
+          <a:p>
+            <a:pPr marL="357188" indent="-357188"/>
+            <a:r>
+              <a:rPr lang="en-IN" sz="2400" dirty="0" smtClean="0"/>
+              <a:t>It </a:t>
+            </a:r>
+            <a:r>
+              <a:rPr lang="en-IN" sz="2400" dirty="0"/>
+              <a:t>is a free source that can handle any kind of build or continuous integration. </a:t>
+            </a:r>
+            <a:endParaRPr lang="en-IN" sz="2400" dirty="0" smtClean="0"/>
+          </a:p>
+          <a:p>
+            <a:pPr marL="357188" indent="-357188"/>
+            <a:r>
+              <a:rPr lang="en-IN" sz="2400" dirty="0" smtClean="0"/>
+              <a:t>You </a:t>
+            </a:r>
+            <a:r>
+              <a:rPr lang="en-IN" sz="2400" dirty="0"/>
+              <a:t>can integrate Jenkins with a number of testing and deployment technologies</a:t>
+            </a:r>
+            <a:r>
+              <a:rPr lang="en-IN" sz="2400"/>
+              <a:t>. </a:t>
+            </a:r>
+            <a:endParaRPr lang="en-IN" sz="2400" dirty="0" smtClean="0"/>
           </a:p>
         </p:txBody>
       </p:sp>
     </p:spTree>
     <p:extLst>
       <p:ext uri="{BB962C8B-B14F-4D97-AF65-F5344CB8AC3E}">
-        <p14:creationId xmlns:p14="http://schemas.microsoft.com/office/powerpoint/2010/main" val="2561436119"/>
+        <p14:creationId xmlns:p14="http://schemas.microsoft.com/office/powerpoint/2010/main" val="2932191839"/>
       </p:ext>
     </p:extLst>
   </p:cSld>
   <p:clrMapOvr>
     <a:masterClrMapping/>
   </p:clrMapOvr>
-  <p:timing>
-    <p:tnLst>
-      <p:par>
-        <p:cTn id="1" dur="indefinite" restart="never" nodeType="tmRoot"/>
-      </p:par>
-    </p:tnLst>
-  </p:timing>
 </p:sld>
 </file>
 
@@ -5894,7 +5998,7 @@
       </p:grpSpPr>
       <p:sp>
         <p:nvSpPr>
-          <p:cNvPr id="2" name="Title 1"/>
+          <p:cNvPr id="4" name="Title 3"/>
           <p:cNvSpPr>
             <a:spLocks noGrp="1"/>
           </p:cNvSpPr>
@@ -5909,42 +6013,35 @@
           <a:p>
             <a:r>
               <a:rPr lang="en-IN" dirty="0" smtClean="0"/>
-              <a:t>New Item for Deployment</a:t>
+              <a:t>Create a Build job in Jenkins</a:t>
             </a:r>
             <a:endParaRPr lang="en-IN" dirty="0"/>
           </a:p>
         </p:txBody>
       </p:sp>
-      <p:pic>
-        <p:nvPicPr>
-          <p:cNvPr id="4" name="Content Placeholder 3"/>
-          <p:cNvPicPr>
-            <a:picLocks noGrp="1" noChangeAspect="1"/>
-          </p:cNvPicPr>
-          <p:nvPr>
-            <p:ph idx="1"/>
-          </p:nvPr>
-        </p:nvPicPr>
-        <p:blipFill>
-          <a:blip r:embed="rId2"/>
-          <a:stretch>
-            <a:fillRect/>
-          </a:stretch>
-        </p:blipFill>
-        <p:spPr>
-          <a:xfrm>
-            <a:off x="1069848" y="2249488"/>
-            <a:ext cx="7207285" cy="4051300"/>
-          </a:xfrm>
-          <a:prstGeom prst="rect">
-            <a:avLst/>
-          </a:prstGeom>
-        </p:spPr>
-      </p:pic>
+      <p:sp>
+        <p:nvSpPr>
+          <p:cNvPr id="5" name="Text Placeholder 4"/>
+          <p:cNvSpPr>
+            <a:spLocks noGrp="1"/>
+          </p:cNvSpPr>
+          <p:nvPr>
+            <p:ph type="body" idx="1"/>
+          </p:nvPr>
+        </p:nvSpPr>
+        <p:spPr/>
+        <p:txBody>
+          <a:bodyPr/>
+          <a:lstStyle/>
+          <a:p>
+            <a:endParaRPr lang="en-IN"/>
+          </a:p>
+        </p:txBody>
+      </p:sp>
     </p:spTree>
     <p:extLst>
       <p:ext uri="{BB962C8B-B14F-4D97-AF65-F5344CB8AC3E}">
-        <p14:creationId xmlns:p14="http://schemas.microsoft.com/office/powerpoint/2010/main" val="4260726930"/>
+        <p14:creationId xmlns:p14="http://schemas.microsoft.com/office/powerpoint/2010/main" val="2787435255"/>
       </p:ext>
     </p:extLst>
   </p:cSld>
@@ -5987,12 +6084,8 @@
           <a:lstStyle/>
           <a:p>
             <a:r>
-              <a:rPr lang="en-IN" dirty="0"/>
-              <a:t>New Item for </a:t>
-            </a:r>
-            <a:r>
               <a:rPr lang="en-IN" dirty="0" smtClean="0"/>
-              <a:t>Deployment - Build</a:t>
+              <a:t>New Item for Deployment</a:t>
             </a:r>
             <a:endParaRPr lang="en-IN" dirty="0"/>
           </a:p>
@@ -6000,7 +6093,7 @@
       </p:sp>
       <p:pic>
         <p:nvPicPr>
-          <p:cNvPr id="6" name="Content Placeholder 5"/>
+          <p:cNvPr id="4" name="Content Placeholder 3"/>
           <p:cNvPicPr>
             <a:picLocks noGrp="1" noChangeAspect="1"/>
           </p:cNvPicPr>
@@ -6016,117 +6109,18 @@
         </p:blipFill>
         <p:spPr>
           <a:xfrm>
-            <a:off x="1069848" y="1706562"/>
-            <a:ext cx="7874260" cy="4979988"/>
+            <a:off x="1069848" y="2249488"/>
+            <a:ext cx="7207285" cy="4051300"/>
           </a:xfrm>
           <a:prstGeom prst="rect">
             <a:avLst/>
           </a:prstGeom>
-          <a:ln>
-            <a:solidFill>
-              <a:schemeClr val="bg1">
-                <a:lumMod val="85000"/>
-              </a:schemeClr>
-            </a:solidFill>
-          </a:ln>
         </p:spPr>
       </p:pic>
-      <p:sp>
-        <p:nvSpPr>
-          <p:cNvPr id="7" name="Rectangle 6"/>
-          <p:cNvSpPr/>
-          <p:nvPr/>
-        </p:nvSpPr>
-        <p:spPr>
-          <a:xfrm>
-            <a:off x="1334169" y="2224626"/>
-            <a:ext cx="964047" cy="232824"/>
-          </a:xfrm>
-          <a:prstGeom prst="rect">
-            <a:avLst/>
-          </a:prstGeom>
-          <a:noFill/>
-          <a:ln w="28575">
-            <a:solidFill>
-              <a:srgbClr val="FF0000"/>
-            </a:solidFill>
-          </a:ln>
-        </p:spPr>
-        <p:style>
-          <a:lnRef idx="2">
-            <a:schemeClr val="accent1">
-              <a:shade val="50000"/>
-            </a:schemeClr>
-          </a:lnRef>
-          <a:fillRef idx="1">
-            <a:schemeClr val="accent1"/>
-          </a:fillRef>
-          <a:effectRef idx="0">
-            <a:schemeClr val="accent1"/>
-          </a:effectRef>
-          <a:fontRef idx="minor">
-            <a:schemeClr val="lt1"/>
-          </a:fontRef>
-        </p:style>
-        <p:txBody>
-          <a:bodyPr rtlCol="0" anchor="ctr"/>
-          <a:lstStyle/>
-          <a:p>
-            <a:pPr algn="ctr"/>
-            <a:endParaRPr lang="en-IN"/>
-          </a:p>
-        </p:txBody>
-      </p:sp>
-      <p:sp>
-        <p:nvSpPr>
-          <p:cNvPr id="8" name="Rectangle 7"/>
-          <p:cNvSpPr/>
-          <p:nvPr/>
-        </p:nvSpPr>
-        <p:spPr>
-          <a:xfrm>
-            <a:off x="1305493" y="5020214"/>
-            <a:ext cx="1878656" cy="232824"/>
-          </a:xfrm>
-          <a:prstGeom prst="rect">
-            <a:avLst/>
-          </a:prstGeom>
-          <a:noFill/>
-          <a:ln w="28575">
-            <a:solidFill>
-              <a:srgbClr val="FF0000"/>
-            </a:solidFill>
-          </a:ln>
-        </p:spPr>
-        <p:style>
-          <a:lnRef idx="2">
-            <a:schemeClr val="accent1">
-              <a:shade val="50000"/>
-            </a:schemeClr>
-          </a:lnRef>
-          <a:fillRef idx="1">
-            <a:schemeClr val="accent1"/>
-          </a:fillRef>
-          <a:effectRef idx="0">
-            <a:schemeClr val="accent1"/>
-          </a:effectRef>
-          <a:fontRef idx="minor">
-            <a:schemeClr val="lt1"/>
-          </a:fontRef>
-        </p:style>
-        <p:txBody>
-          <a:bodyPr rtlCol="0" anchor="ctr"/>
-          <a:lstStyle/>
-          <a:p>
-            <a:pPr algn="ctr"/>
-            <a:endParaRPr lang="en-IN"/>
-          </a:p>
-        </p:txBody>
-      </p:sp>
     </p:spTree>
     <p:extLst>
       <p:ext uri="{BB962C8B-B14F-4D97-AF65-F5344CB8AC3E}">
-        <p14:creationId xmlns:p14="http://schemas.microsoft.com/office/powerpoint/2010/main" val="712183839"/>
+        <p14:creationId xmlns:p14="http://schemas.microsoft.com/office/powerpoint/2010/main" val="4260726930"/>
       </p:ext>
     </p:extLst>
   </p:cSld>
@@ -6169,8 +6163,12 @@
           <a:lstStyle/>
           <a:p>
             <a:r>
+              <a:rPr lang="en-IN" dirty="0"/>
+              <a:t>New Item for </a:t>
+            </a:r>
+            <a:r>
               <a:rPr lang="en-IN" dirty="0" smtClean="0"/>
-              <a:t>Manage Jenkins – Configure System</a:t>
+              <a:t>Deployment - Build</a:t>
             </a:r>
             <a:endParaRPr lang="en-IN" dirty="0"/>
           </a:p>
@@ -6178,7 +6176,7 @@
       </p:sp>
       <p:pic>
         <p:nvPicPr>
-          <p:cNvPr id="4" name="Content Placeholder 3"/>
+          <p:cNvPr id="6" name="Content Placeholder 5"/>
           <p:cNvPicPr>
             <a:picLocks noGrp="1" noChangeAspect="1"/>
           </p:cNvPicPr>
@@ -6194,24 +6192,31 @@
         </p:blipFill>
         <p:spPr>
           <a:xfrm>
-            <a:off x="1055563" y="2108264"/>
-            <a:ext cx="10039644" cy="3649599"/>
+            <a:off x="1069848" y="1706562"/>
+            <a:ext cx="7874260" cy="4979988"/>
           </a:xfrm>
           <a:prstGeom prst="rect">
             <a:avLst/>
           </a:prstGeom>
+          <a:ln>
+            <a:solidFill>
+              <a:schemeClr val="bg1">
+                <a:lumMod val="85000"/>
+              </a:schemeClr>
+            </a:solidFill>
+          </a:ln>
         </p:spPr>
       </p:pic>
       <p:sp>
         <p:nvSpPr>
-          <p:cNvPr id="5" name="Rectangle 4"/>
+          <p:cNvPr id="7" name="Rectangle 6"/>
           <p:cNvSpPr/>
           <p:nvPr/>
         </p:nvSpPr>
         <p:spPr>
           <a:xfrm>
-            <a:off x="1539088" y="4253451"/>
-            <a:ext cx="1411462" cy="232824"/>
+            <a:off x="1334169" y="2224626"/>
+            <a:ext cx="964047" cy="232824"/>
           </a:xfrm>
           <a:prstGeom prst="rect">
             <a:avLst/>
@@ -6250,14 +6255,14 @@
       </p:sp>
       <p:sp>
         <p:nvSpPr>
-          <p:cNvPr id="7" name="Rectangle 6"/>
+          <p:cNvPr id="8" name="Rectangle 7"/>
           <p:cNvSpPr/>
           <p:nvPr/>
         </p:nvSpPr>
         <p:spPr>
           <a:xfrm>
-            <a:off x="5393317" y="4020627"/>
-            <a:ext cx="3779258" cy="751398"/>
+            <a:off x="1305493" y="5020214"/>
+            <a:ext cx="1878656" cy="232824"/>
           </a:xfrm>
           <a:prstGeom prst="rect">
             <a:avLst/>
@@ -6297,7 +6302,7 @@
     </p:spTree>
     <p:extLst>
       <p:ext uri="{BB962C8B-B14F-4D97-AF65-F5344CB8AC3E}">
-        <p14:creationId xmlns:p14="http://schemas.microsoft.com/office/powerpoint/2010/main" val="2946088262"/>
+        <p14:creationId xmlns:p14="http://schemas.microsoft.com/office/powerpoint/2010/main" val="712183839"/>
       </p:ext>
     </p:extLst>
   </p:cSld>
@@ -6341,6 +6346,177 @@
           <a:p>
             <a:r>
               <a:rPr lang="en-IN" dirty="0" smtClean="0"/>
+              <a:t>Manage Jenkins – Configure System</a:t>
+            </a:r>
+            <a:endParaRPr lang="en-IN" dirty="0"/>
+          </a:p>
+        </p:txBody>
+      </p:sp>
+      <p:pic>
+        <p:nvPicPr>
+          <p:cNvPr id="4" name="Content Placeholder 3"/>
+          <p:cNvPicPr>
+            <a:picLocks noGrp="1" noChangeAspect="1"/>
+          </p:cNvPicPr>
+          <p:nvPr>
+            <p:ph idx="1"/>
+          </p:nvPr>
+        </p:nvPicPr>
+        <p:blipFill>
+          <a:blip r:embed="rId2"/>
+          <a:stretch>
+            <a:fillRect/>
+          </a:stretch>
+        </p:blipFill>
+        <p:spPr>
+          <a:xfrm>
+            <a:off x="1055563" y="2108264"/>
+            <a:ext cx="10039644" cy="3649599"/>
+          </a:xfrm>
+          <a:prstGeom prst="rect">
+            <a:avLst/>
+          </a:prstGeom>
+        </p:spPr>
+      </p:pic>
+      <p:sp>
+        <p:nvSpPr>
+          <p:cNvPr id="5" name="Rectangle 4"/>
+          <p:cNvSpPr/>
+          <p:nvPr/>
+        </p:nvSpPr>
+        <p:spPr>
+          <a:xfrm>
+            <a:off x="1539088" y="4253451"/>
+            <a:ext cx="1411462" cy="232824"/>
+          </a:xfrm>
+          <a:prstGeom prst="rect">
+            <a:avLst/>
+          </a:prstGeom>
+          <a:noFill/>
+          <a:ln w="28575">
+            <a:solidFill>
+              <a:srgbClr val="FF0000"/>
+            </a:solidFill>
+          </a:ln>
+        </p:spPr>
+        <p:style>
+          <a:lnRef idx="2">
+            <a:schemeClr val="accent1">
+              <a:shade val="50000"/>
+            </a:schemeClr>
+          </a:lnRef>
+          <a:fillRef idx="1">
+            <a:schemeClr val="accent1"/>
+          </a:fillRef>
+          <a:effectRef idx="0">
+            <a:schemeClr val="accent1"/>
+          </a:effectRef>
+          <a:fontRef idx="minor">
+            <a:schemeClr val="lt1"/>
+          </a:fontRef>
+        </p:style>
+        <p:txBody>
+          <a:bodyPr rtlCol="0" anchor="ctr"/>
+          <a:lstStyle/>
+          <a:p>
+            <a:pPr algn="ctr"/>
+            <a:endParaRPr lang="en-IN"/>
+          </a:p>
+        </p:txBody>
+      </p:sp>
+      <p:sp>
+        <p:nvSpPr>
+          <p:cNvPr id="7" name="Rectangle 6"/>
+          <p:cNvSpPr/>
+          <p:nvPr/>
+        </p:nvSpPr>
+        <p:spPr>
+          <a:xfrm>
+            <a:off x="5393317" y="4020627"/>
+            <a:ext cx="3779258" cy="751398"/>
+          </a:xfrm>
+          <a:prstGeom prst="rect">
+            <a:avLst/>
+          </a:prstGeom>
+          <a:noFill/>
+          <a:ln w="28575">
+            <a:solidFill>
+              <a:srgbClr val="FF0000"/>
+            </a:solidFill>
+          </a:ln>
+        </p:spPr>
+        <p:style>
+          <a:lnRef idx="2">
+            <a:schemeClr val="accent1">
+              <a:shade val="50000"/>
+            </a:schemeClr>
+          </a:lnRef>
+          <a:fillRef idx="1">
+            <a:schemeClr val="accent1"/>
+          </a:fillRef>
+          <a:effectRef idx="0">
+            <a:schemeClr val="accent1"/>
+          </a:effectRef>
+          <a:fontRef idx="minor">
+            <a:schemeClr val="lt1"/>
+          </a:fontRef>
+        </p:style>
+        <p:txBody>
+          <a:bodyPr rtlCol="0" anchor="ctr"/>
+          <a:lstStyle/>
+          <a:p>
+            <a:pPr algn="ctr"/>
+            <a:endParaRPr lang="en-IN"/>
+          </a:p>
+        </p:txBody>
+      </p:sp>
+    </p:spTree>
+    <p:extLst>
+      <p:ext uri="{BB962C8B-B14F-4D97-AF65-F5344CB8AC3E}">
+        <p14:creationId xmlns:p14="http://schemas.microsoft.com/office/powerpoint/2010/main" val="2946088262"/>
+      </p:ext>
+    </p:extLst>
+  </p:cSld>
+  <p:clrMapOvr>
+    <a:masterClrMapping/>
+  </p:clrMapOvr>
+</p:sld>
+</file>
+
+<file path=ppt/slides/slide24.xml><?xml version="1.0" encoding="utf-8"?>
+<p:sld xmlns:a="http://schemas.openxmlformats.org/drawingml/2006/main" xmlns:r="http://schemas.openxmlformats.org/officeDocument/2006/relationships" xmlns:p="http://schemas.openxmlformats.org/presentationml/2006/main">
+  <p:cSld>
+    <p:spTree>
+      <p:nvGrpSpPr>
+        <p:cNvPr id="1" name=""/>
+        <p:cNvGrpSpPr/>
+        <p:nvPr/>
+      </p:nvGrpSpPr>
+      <p:grpSpPr>
+        <a:xfrm>
+          <a:off x="0" y="0"/>
+          <a:ext cx="0" cy="0"/>
+          <a:chOff x="0" y="0"/>
+          <a:chExt cx="0" cy="0"/>
+        </a:xfrm>
+      </p:grpSpPr>
+      <p:sp>
+        <p:nvSpPr>
+          <p:cNvPr id="2" name="Title 1"/>
+          <p:cNvSpPr>
+            <a:spLocks noGrp="1"/>
+          </p:cNvSpPr>
+          <p:nvPr>
+            <p:ph type="title"/>
+          </p:nvPr>
+        </p:nvSpPr>
+        <p:spPr/>
+        <p:txBody>
+          <a:bodyPr/>
+          <a:lstStyle/>
+          <a:p>
+            <a:r>
+              <a:rPr lang="en-IN" dirty="0" smtClean="0"/>
               <a:t>War file location path</a:t>
             </a:r>
             <a:endParaRPr lang="en-IN" dirty="0"/>
@@ -6416,7 +6592,7 @@
 </p:sld>
 </file>
 
-<file path=ppt/slides/slide24.xml><?xml version="1.0" encoding="utf-8"?>
+<file path=ppt/slides/slide25.xml><?xml version="1.0" encoding="utf-8"?>
 <p:sld xmlns:a="http://schemas.openxmlformats.org/drawingml/2006/main" xmlns:r="http://schemas.openxmlformats.org/officeDocument/2006/relationships" xmlns:p="http://schemas.openxmlformats.org/presentationml/2006/main">
   <p:cSld>
     <p:spTree>
@@ -6517,256 +6693,28 @@
           <a:lstStyle/>
           <a:p>
             <a:r>
-              <a:rPr lang="en-IN" dirty="0">
-                <a:hlinkClick r:id="rId2"/>
-              </a:rPr>
-              <a:t>https://jenkins.io/download/</a:t>
+              <a:rPr lang="en-IN" dirty="0" smtClean="0"/>
+              <a:t>Installation</a:t>
             </a:r>
             <a:endParaRPr lang="en-IN" dirty="0"/>
           </a:p>
         </p:txBody>
       </p:sp>
-      <p:pic>
-        <p:nvPicPr>
-          <p:cNvPr id="6" name="Content Placeholder 5"/>
-          <p:cNvPicPr>
-            <a:picLocks noGrp="1" noChangeAspect="1"/>
-          </p:cNvPicPr>
-          <p:nvPr>
-            <p:ph idx="1"/>
-          </p:nvPr>
-        </p:nvPicPr>
-        <p:blipFill>
-          <a:blip r:embed="rId3"/>
-          <a:stretch>
-            <a:fillRect/>
-          </a:stretch>
-        </p:blipFill>
-        <p:spPr>
-          <a:xfrm>
-            <a:off x="1069848" y="2378076"/>
-            <a:ext cx="8591834" cy="4394200"/>
-          </a:xfrm>
-          <a:prstGeom prst="rect">
-            <a:avLst/>
-          </a:prstGeom>
-          <a:ln>
-            <a:solidFill>
-              <a:schemeClr val="bg1">
-                <a:lumMod val="85000"/>
-              </a:schemeClr>
-            </a:solidFill>
-          </a:ln>
-        </p:spPr>
-      </p:pic>
-      <p:sp>
-        <p:nvSpPr>
-          <p:cNvPr id="7" name="Rectangle 6"/>
-          <p:cNvSpPr/>
-          <p:nvPr/>
-        </p:nvSpPr>
-        <p:spPr>
-          <a:xfrm>
-            <a:off x="2100263" y="2371727"/>
-            <a:ext cx="1243012" cy="214311"/>
-          </a:xfrm>
-          <a:prstGeom prst="rect">
-            <a:avLst/>
-          </a:prstGeom>
-          <a:noFill/>
-          <a:ln w="28575">
-            <a:solidFill>
-              <a:srgbClr val="FF0000"/>
-            </a:solidFill>
-          </a:ln>
-        </p:spPr>
-        <p:style>
-          <a:lnRef idx="2">
-            <a:schemeClr val="accent1">
-              <a:shade val="50000"/>
-            </a:schemeClr>
-          </a:lnRef>
-          <a:fillRef idx="1">
-            <a:schemeClr val="accent1"/>
-          </a:fillRef>
-          <a:effectRef idx="0">
-            <a:schemeClr val="accent1"/>
-          </a:effectRef>
-          <a:fontRef idx="minor">
-            <a:schemeClr val="lt1"/>
-          </a:fontRef>
-        </p:style>
-        <p:txBody>
-          <a:bodyPr rtlCol="0" anchor="ctr"/>
-          <a:lstStyle/>
-          <a:p>
-            <a:pPr algn="ctr"/>
-            <a:endParaRPr lang="en-IN"/>
-          </a:p>
-        </p:txBody>
-      </p:sp>
-      <p:sp>
-        <p:nvSpPr>
-          <p:cNvPr id="8" name="Rectangle 7"/>
-          <p:cNvSpPr/>
-          <p:nvPr/>
-        </p:nvSpPr>
-        <p:spPr>
-          <a:xfrm>
-            <a:off x="2514601" y="5624516"/>
-            <a:ext cx="571500" cy="185737"/>
-          </a:xfrm>
-          <a:prstGeom prst="rect">
-            <a:avLst/>
-          </a:prstGeom>
-          <a:noFill/>
-          <a:ln w="28575">
-            <a:solidFill>
-              <a:srgbClr val="FF0000"/>
-            </a:solidFill>
-          </a:ln>
-        </p:spPr>
-        <p:style>
-          <a:lnRef idx="2">
-            <a:schemeClr val="accent1">
-              <a:shade val="50000"/>
-            </a:schemeClr>
-          </a:lnRef>
-          <a:fillRef idx="1">
-            <a:schemeClr val="accent1"/>
-          </a:fillRef>
-          <a:effectRef idx="0">
-            <a:schemeClr val="accent1"/>
-          </a:effectRef>
-          <a:fontRef idx="minor">
-            <a:schemeClr val="lt1"/>
-          </a:fontRef>
-        </p:style>
-        <p:txBody>
-          <a:bodyPr rtlCol="0" anchor="ctr"/>
-          <a:lstStyle/>
-          <a:p>
-            <a:pPr algn="ctr"/>
-            <a:endParaRPr lang="en-IN"/>
-          </a:p>
-        </p:txBody>
-      </p:sp>
-      <p:sp>
-        <p:nvSpPr>
-          <p:cNvPr id="9" name="Rectangle 8"/>
-          <p:cNvSpPr/>
-          <p:nvPr/>
-        </p:nvSpPr>
-        <p:spPr>
-          <a:xfrm>
-            <a:off x="1069847" y="6477003"/>
-            <a:ext cx="1444753" cy="295273"/>
-          </a:xfrm>
-          <a:prstGeom prst="rect">
-            <a:avLst/>
-          </a:prstGeom>
-          <a:noFill/>
-          <a:ln w="28575">
-            <a:solidFill>
-              <a:srgbClr val="FF0000"/>
-            </a:solidFill>
-          </a:ln>
-        </p:spPr>
-        <p:style>
-          <a:lnRef idx="2">
-            <a:schemeClr val="accent1">
-              <a:shade val="50000"/>
-            </a:schemeClr>
-          </a:lnRef>
-          <a:fillRef idx="1">
-            <a:schemeClr val="accent1"/>
-          </a:fillRef>
-          <a:effectRef idx="0">
-            <a:schemeClr val="accent1"/>
-          </a:effectRef>
-          <a:fontRef idx="minor">
-            <a:schemeClr val="lt1"/>
-          </a:fontRef>
-        </p:style>
-        <p:txBody>
-          <a:bodyPr rtlCol="0" anchor="ctr"/>
-          <a:lstStyle/>
-          <a:p>
-            <a:pPr algn="ctr"/>
-            <a:endParaRPr lang="en-IN"/>
-          </a:p>
-        </p:txBody>
-      </p:sp>
-      <p:pic>
-        <p:nvPicPr>
-          <p:cNvPr id="10" name="Picture 9"/>
-          <p:cNvPicPr>
-            <a:picLocks noChangeAspect="1"/>
-          </p:cNvPicPr>
-          <p:nvPr/>
-        </p:nvPicPr>
-        <p:blipFill rotWithShape="1">
-          <a:blip r:embed="rId4"/>
-          <a:srcRect l="19781"/>
-          <a:stretch/>
-        </p:blipFill>
-        <p:spPr>
-          <a:xfrm>
-            <a:off x="7400924" y="4705352"/>
-            <a:ext cx="4171901" cy="1390650"/>
-          </a:xfrm>
-          <a:prstGeom prst="rect">
-            <a:avLst/>
-          </a:prstGeom>
-          <a:ln w="38100">
-            <a:solidFill>
-              <a:srgbClr val="FFFF00"/>
-            </a:solidFill>
-          </a:ln>
-        </p:spPr>
-      </p:pic>
-      <p:sp>
-        <p:nvSpPr>
-          <p:cNvPr id="12" name="Rectangle 11"/>
-          <p:cNvSpPr/>
-          <p:nvPr/>
-        </p:nvSpPr>
-        <p:spPr>
-          <a:xfrm>
-            <a:off x="7443788" y="5303052"/>
-            <a:ext cx="742951" cy="321464"/>
-          </a:xfrm>
-          <a:prstGeom prst="rect">
-            <a:avLst/>
-          </a:prstGeom>
-          <a:noFill/>
-          <a:ln w="28575">
-            <a:solidFill>
-              <a:srgbClr val="FF0000"/>
-            </a:solidFill>
-          </a:ln>
-        </p:spPr>
-        <p:style>
-          <a:lnRef idx="2">
-            <a:schemeClr val="accent1">
-              <a:shade val="50000"/>
-            </a:schemeClr>
-          </a:lnRef>
-          <a:fillRef idx="1">
-            <a:schemeClr val="accent1"/>
-          </a:fillRef>
-          <a:effectRef idx="0">
-            <a:schemeClr val="accent1"/>
-          </a:effectRef>
-          <a:fontRef idx="minor">
-            <a:schemeClr val="lt1"/>
-          </a:fontRef>
-        </p:style>
-        <p:txBody>
-          <a:bodyPr rtlCol="0" anchor="ctr"/>
-          <a:lstStyle/>
-          <a:p>
-            <a:pPr algn="ctr"/>
+      <p:sp>
+        <p:nvSpPr>
+          <p:cNvPr id="5" name="Text Placeholder 4"/>
+          <p:cNvSpPr>
+            <a:spLocks noGrp="1"/>
+          </p:cNvSpPr>
+          <p:nvPr>
+            <p:ph type="body" idx="1"/>
+          </p:nvPr>
+        </p:nvSpPr>
+        <p:spPr/>
+        <p:txBody>
+          <a:bodyPr/>
+          <a:lstStyle/>
+          <a:p>
             <a:endParaRPr lang="en-IN"/>
           </a:p>
         </p:txBody>
@@ -6774,7 +6722,7 @@
     </p:spTree>
     <p:extLst>
       <p:ext uri="{BB962C8B-B14F-4D97-AF65-F5344CB8AC3E}">
-        <p14:creationId xmlns:p14="http://schemas.microsoft.com/office/powerpoint/2010/main" val="1438354162"/>
+        <p14:creationId xmlns:p14="http://schemas.microsoft.com/office/powerpoint/2010/main" val="2561436119"/>
       </p:ext>
     </p:extLst>
   </p:cSld>
@@ -6810,7 +6758,7 @@
       </p:grpSpPr>
       <p:sp>
         <p:nvSpPr>
-          <p:cNvPr id="2" name="Title 1"/>
+          <p:cNvPr id="4" name="Title 3"/>
           <p:cNvSpPr>
             <a:spLocks noGrp="1"/>
           </p:cNvSpPr>
@@ -6824,8 +6772,10 @@
           <a:lstStyle/>
           <a:p>
             <a:r>
-              <a:rPr lang="en-IN" dirty="0" smtClean="0"/>
-              <a:t>Jenkins Login Credentials</a:t>
+              <a:rPr lang="en-IN" dirty="0">
+                <a:hlinkClick r:id="rId2"/>
+              </a:rPr>
+              <a:t>https://jenkins.io/download/</a:t>
             </a:r>
             <a:endParaRPr lang="en-IN" dirty="0"/>
           </a:p>
@@ -6833,7 +6783,7 @@
       </p:sp>
       <p:pic>
         <p:nvPicPr>
-          <p:cNvPr id="4" name="Content Placeholder 3"/>
+          <p:cNvPr id="6" name="Content Placeholder 5"/>
           <p:cNvPicPr>
             <a:picLocks noGrp="1" noChangeAspect="1"/>
           </p:cNvPicPr>
@@ -6842,15 +6792,15 @@
           </p:nvPr>
         </p:nvPicPr>
         <p:blipFill>
-          <a:blip r:embed="rId2"/>
+          <a:blip r:embed="rId3"/>
           <a:stretch>
             <a:fillRect/>
           </a:stretch>
         </p:blipFill>
         <p:spPr>
           <a:xfrm>
-            <a:off x="1069848" y="2335213"/>
-            <a:ext cx="8319767" cy="4051300"/>
+            <a:off x="1069848" y="2378076"/>
+            <a:ext cx="8591834" cy="4394200"/>
           </a:xfrm>
           <a:prstGeom prst="rect">
             <a:avLst/>
@@ -6864,10 +6814,222 @@
           </a:ln>
         </p:spPr>
       </p:pic>
+      <p:sp>
+        <p:nvSpPr>
+          <p:cNvPr id="7" name="Rectangle 6"/>
+          <p:cNvSpPr/>
+          <p:nvPr/>
+        </p:nvSpPr>
+        <p:spPr>
+          <a:xfrm>
+            <a:off x="2100263" y="2371727"/>
+            <a:ext cx="1243012" cy="214311"/>
+          </a:xfrm>
+          <a:prstGeom prst="rect">
+            <a:avLst/>
+          </a:prstGeom>
+          <a:noFill/>
+          <a:ln w="28575">
+            <a:solidFill>
+              <a:srgbClr val="FF0000"/>
+            </a:solidFill>
+          </a:ln>
+        </p:spPr>
+        <p:style>
+          <a:lnRef idx="2">
+            <a:schemeClr val="accent1">
+              <a:shade val="50000"/>
+            </a:schemeClr>
+          </a:lnRef>
+          <a:fillRef idx="1">
+            <a:schemeClr val="accent1"/>
+          </a:fillRef>
+          <a:effectRef idx="0">
+            <a:schemeClr val="accent1"/>
+          </a:effectRef>
+          <a:fontRef idx="minor">
+            <a:schemeClr val="lt1"/>
+          </a:fontRef>
+        </p:style>
+        <p:txBody>
+          <a:bodyPr rtlCol="0" anchor="ctr"/>
+          <a:lstStyle/>
+          <a:p>
+            <a:pPr algn="ctr"/>
+            <a:endParaRPr lang="en-IN"/>
+          </a:p>
+        </p:txBody>
+      </p:sp>
+      <p:sp>
+        <p:nvSpPr>
+          <p:cNvPr id="8" name="Rectangle 7"/>
+          <p:cNvSpPr/>
+          <p:nvPr/>
+        </p:nvSpPr>
+        <p:spPr>
+          <a:xfrm>
+            <a:off x="2514601" y="5624516"/>
+            <a:ext cx="571500" cy="185737"/>
+          </a:xfrm>
+          <a:prstGeom prst="rect">
+            <a:avLst/>
+          </a:prstGeom>
+          <a:noFill/>
+          <a:ln w="28575">
+            <a:solidFill>
+              <a:srgbClr val="FF0000"/>
+            </a:solidFill>
+          </a:ln>
+        </p:spPr>
+        <p:style>
+          <a:lnRef idx="2">
+            <a:schemeClr val="accent1">
+              <a:shade val="50000"/>
+            </a:schemeClr>
+          </a:lnRef>
+          <a:fillRef idx="1">
+            <a:schemeClr val="accent1"/>
+          </a:fillRef>
+          <a:effectRef idx="0">
+            <a:schemeClr val="accent1"/>
+          </a:effectRef>
+          <a:fontRef idx="minor">
+            <a:schemeClr val="lt1"/>
+          </a:fontRef>
+        </p:style>
+        <p:txBody>
+          <a:bodyPr rtlCol="0" anchor="ctr"/>
+          <a:lstStyle/>
+          <a:p>
+            <a:pPr algn="ctr"/>
+            <a:endParaRPr lang="en-IN"/>
+          </a:p>
+        </p:txBody>
+      </p:sp>
+      <p:sp>
+        <p:nvSpPr>
+          <p:cNvPr id="9" name="Rectangle 8"/>
+          <p:cNvSpPr/>
+          <p:nvPr/>
+        </p:nvSpPr>
+        <p:spPr>
+          <a:xfrm>
+            <a:off x="1069847" y="6477003"/>
+            <a:ext cx="1444753" cy="295273"/>
+          </a:xfrm>
+          <a:prstGeom prst="rect">
+            <a:avLst/>
+          </a:prstGeom>
+          <a:noFill/>
+          <a:ln w="28575">
+            <a:solidFill>
+              <a:srgbClr val="FF0000"/>
+            </a:solidFill>
+          </a:ln>
+        </p:spPr>
+        <p:style>
+          <a:lnRef idx="2">
+            <a:schemeClr val="accent1">
+              <a:shade val="50000"/>
+            </a:schemeClr>
+          </a:lnRef>
+          <a:fillRef idx="1">
+            <a:schemeClr val="accent1"/>
+          </a:fillRef>
+          <a:effectRef idx="0">
+            <a:schemeClr val="accent1"/>
+          </a:effectRef>
+          <a:fontRef idx="minor">
+            <a:schemeClr val="lt1"/>
+          </a:fontRef>
+        </p:style>
+        <p:txBody>
+          <a:bodyPr rtlCol="0" anchor="ctr"/>
+          <a:lstStyle/>
+          <a:p>
+            <a:pPr algn="ctr"/>
+            <a:endParaRPr lang="en-IN"/>
+          </a:p>
+        </p:txBody>
+      </p:sp>
+      <p:pic>
+        <p:nvPicPr>
+          <p:cNvPr id="10" name="Picture 9"/>
+          <p:cNvPicPr>
+            <a:picLocks noChangeAspect="1"/>
+          </p:cNvPicPr>
+          <p:nvPr/>
+        </p:nvPicPr>
+        <p:blipFill rotWithShape="1">
+          <a:blip r:embed="rId4"/>
+          <a:srcRect l="19781"/>
+          <a:stretch/>
+        </p:blipFill>
+        <p:spPr>
+          <a:xfrm>
+            <a:off x="7400924" y="4705352"/>
+            <a:ext cx="4171901" cy="1390650"/>
+          </a:xfrm>
+          <a:prstGeom prst="rect">
+            <a:avLst/>
+          </a:prstGeom>
+          <a:ln w="38100">
+            <a:solidFill>
+              <a:srgbClr val="FFFF00"/>
+            </a:solidFill>
+          </a:ln>
+        </p:spPr>
+      </p:pic>
+      <p:sp>
+        <p:nvSpPr>
+          <p:cNvPr id="12" name="Rectangle 11"/>
+          <p:cNvSpPr/>
+          <p:nvPr/>
+        </p:nvSpPr>
+        <p:spPr>
+          <a:xfrm>
+            <a:off x="7443788" y="5303052"/>
+            <a:ext cx="742951" cy="321464"/>
+          </a:xfrm>
+          <a:prstGeom prst="rect">
+            <a:avLst/>
+          </a:prstGeom>
+          <a:noFill/>
+          <a:ln w="28575">
+            <a:solidFill>
+              <a:srgbClr val="FF0000"/>
+            </a:solidFill>
+          </a:ln>
+        </p:spPr>
+        <p:style>
+          <a:lnRef idx="2">
+            <a:schemeClr val="accent1">
+              <a:shade val="50000"/>
+            </a:schemeClr>
+          </a:lnRef>
+          <a:fillRef idx="1">
+            <a:schemeClr val="accent1"/>
+          </a:fillRef>
+          <a:effectRef idx="0">
+            <a:schemeClr val="accent1"/>
+          </a:effectRef>
+          <a:fontRef idx="minor">
+            <a:schemeClr val="lt1"/>
+          </a:fontRef>
+        </p:style>
+        <p:txBody>
+          <a:bodyPr rtlCol="0" anchor="ctr"/>
+          <a:lstStyle/>
+          <a:p>
+            <a:pPr algn="ctr"/>
+            <a:endParaRPr lang="en-IN"/>
+          </a:p>
+        </p:txBody>
+      </p:sp>
     </p:spTree>
     <p:extLst>
       <p:ext uri="{BB962C8B-B14F-4D97-AF65-F5344CB8AC3E}">
-        <p14:creationId xmlns:p14="http://schemas.microsoft.com/office/powerpoint/2010/main" val="2432600393"/>
+        <p14:creationId xmlns:p14="http://schemas.microsoft.com/office/powerpoint/2010/main" val="1438354162"/>
       </p:ext>
     </p:extLst>
   </p:cSld>
@@ -6918,7 +7080,7 @@
           <a:p>
             <a:r>
               <a:rPr lang="en-IN" dirty="0" smtClean="0"/>
-              <a:t>Jenkins Setup</a:t>
+              <a:t>Jenkins Login Credentials</a:t>
             </a:r>
             <a:endParaRPr lang="en-IN" dirty="0"/>
           </a:p>
@@ -6942,8 +7104,8 @@
         </p:blipFill>
         <p:spPr>
           <a:xfrm>
-            <a:off x="1212723" y="1935163"/>
-            <a:ext cx="7183952" cy="4051300"/>
+            <a:off x="1069848" y="2335213"/>
+            <a:ext cx="8319767" cy="4051300"/>
           </a:xfrm>
           <a:prstGeom prst="rect">
             <a:avLst/>
@@ -6960,7 +7122,7 @@
     </p:spTree>
     <p:extLst>
       <p:ext uri="{BB962C8B-B14F-4D97-AF65-F5344CB8AC3E}">
-        <p14:creationId xmlns:p14="http://schemas.microsoft.com/office/powerpoint/2010/main" val="826457965"/>
+        <p14:creationId xmlns:p14="http://schemas.microsoft.com/office/powerpoint/2010/main" val="2432600393"/>
       </p:ext>
     </p:extLst>
   </p:cSld>
@@ -7011,7 +7173,7 @@
           <a:p>
             <a:r>
               <a:rPr lang="en-IN" dirty="0" smtClean="0"/>
-              <a:t>Install Suggested Plugins</a:t>
+              <a:t>Jenkins Setup</a:t>
             </a:r>
             <a:endParaRPr lang="en-IN" dirty="0"/>
           </a:p>
@@ -7035,18 +7197,25 @@
         </p:blipFill>
         <p:spPr>
           <a:xfrm>
-            <a:off x="1184741" y="1871663"/>
-            <a:ext cx="8301179" cy="4863973"/>
+            <a:off x="1212723" y="1935163"/>
+            <a:ext cx="7183952" cy="4051300"/>
           </a:xfrm>
           <a:prstGeom prst="rect">
             <a:avLst/>
           </a:prstGeom>
+          <a:ln>
+            <a:solidFill>
+              <a:schemeClr val="bg1">
+                <a:lumMod val="85000"/>
+              </a:schemeClr>
+            </a:solidFill>
+          </a:ln>
         </p:spPr>
       </p:pic>
     </p:spTree>
     <p:extLst>
       <p:ext uri="{BB962C8B-B14F-4D97-AF65-F5344CB8AC3E}">
-        <p14:creationId xmlns:p14="http://schemas.microsoft.com/office/powerpoint/2010/main" val="979614093"/>
+        <p14:creationId xmlns:p14="http://schemas.microsoft.com/office/powerpoint/2010/main" val="826457965"/>
       </p:ext>
     </p:extLst>
   </p:cSld>
@@ -7097,7 +7266,7 @@
           <a:p>
             <a:r>
               <a:rPr lang="en-IN" dirty="0" smtClean="0"/>
-              <a:t>Setup Admin User</a:t>
+              <a:t>Install Suggested Plugins</a:t>
             </a:r>
             <a:endParaRPr lang="en-IN" dirty="0"/>
           </a:p>
@@ -7121,8 +7290,8 @@
         </p:blipFill>
         <p:spPr>
           <a:xfrm>
-            <a:off x="1069848" y="2093976"/>
-            <a:ext cx="6796154" cy="4051300"/>
+            <a:off x="1184741" y="1871663"/>
+            <a:ext cx="8301179" cy="4863973"/>
           </a:xfrm>
           <a:prstGeom prst="rect">
             <a:avLst/>
@@ -7132,7 +7301,7 @@
     </p:spTree>
     <p:extLst>
       <p:ext uri="{BB962C8B-B14F-4D97-AF65-F5344CB8AC3E}">
-        <p14:creationId xmlns:p14="http://schemas.microsoft.com/office/powerpoint/2010/main" val="1812305366"/>
+        <p14:creationId xmlns:p14="http://schemas.microsoft.com/office/powerpoint/2010/main" val="979614093"/>
       </p:ext>
     </p:extLst>
   </p:cSld>
@@ -7183,7 +7352,7 @@
           <a:p>
             <a:r>
               <a:rPr lang="en-IN" dirty="0" smtClean="0"/>
-              <a:t>Instance Configuration</a:t>
+              <a:t>Setup Admin User</a:t>
             </a:r>
             <a:endParaRPr lang="en-IN" dirty="0"/>
           </a:p>
@@ -7208,7 +7377,7 @@
         <p:spPr>
           <a:xfrm>
             <a:off x="1069848" y="2093976"/>
-            <a:ext cx="6824628" cy="4051300"/>
+            <a:ext cx="6796154" cy="4051300"/>
           </a:xfrm>
           <a:prstGeom prst="rect">
             <a:avLst/>
@@ -7218,7 +7387,7 @@
     </p:spTree>
     <p:extLst>
       <p:ext uri="{BB962C8B-B14F-4D97-AF65-F5344CB8AC3E}">
-        <p14:creationId xmlns:p14="http://schemas.microsoft.com/office/powerpoint/2010/main" val="536336935"/>
+        <p14:creationId xmlns:p14="http://schemas.microsoft.com/office/powerpoint/2010/main" val="1812305366"/>
       </p:ext>
     </p:extLst>
   </p:cSld>
@@ -7269,7 +7438,7 @@
           <a:p>
             <a:r>
               <a:rPr lang="en-IN" dirty="0" smtClean="0"/>
-              <a:t>Empty Dashboard</a:t>
+              <a:t>Instance Configuration</a:t>
             </a:r>
             <a:endParaRPr lang="en-IN" dirty="0"/>
           </a:p>
@@ -7294,70 +7463,17 @@
         <p:spPr>
           <a:xfrm>
             <a:off x="1069848" y="2093976"/>
-            <a:ext cx="4782604" cy="4051300"/>
+            <a:ext cx="6824628" cy="4051300"/>
           </a:xfrm>
           <a:prstGeom prst="rect">
             <a:avLst/>
           </a:prstGeom>
-          <a:ln>
-            <a:solidFill>
-              <a:schemeClr val="bg1">
-                <a:lumMod val="85000"/>
-              </a:schemeClr>
-            </a:solidFill>
-          </a:ln>
         </p:spPr>
       </p:pic>
-      <p:sp>
-        <p:nvSpPr>
-          <p:cNvPr id="5" name="Rectangle 4"/>
-          <p:cNvSpPr/>
-          <p:nvPr/>
-        </p:nvSpPr>
-        <p:spPr>
-          <a:xfrm>
-            <a:off x="3486150" y="3514724"/>
-            <a:ext cx="1757362" cy="310038"/>
-          </a:xfrm>
-          <a:prstGeom prst="rect">
-            <a:avLst/>
-          </a:prstGeom>
-          <a:noFill/>
-          <a:ln w="28575">
-            <a:solidFill>
-              <a:srgbClr val="FF0000"/>
-            </a:solidFill>
-          </a:ln>
-        </p:spPr>
-        <p:style>
-          <a:lnRef idx="2">
-            <a:schemeClr val="accent1">
-              <a:shade val="50000"/>
-            </a:schemeClr>
-          </a:lnRef>
-          <a:fillRef idx="1">
-            <a:schemeClr val="accent1"/>
-          </a:fillRef>
-          <a:effectRef idx="0">
-            <a:schemeClr val="accent1"/>
-          </a:effectRef>
-          <a:fontRef idx="minor">
-            <a:schemeClr val="lt1"/>
-          </a:fontRef>
-        </p:style>
-        <p:txBody>
-          <a:bodyPr rtlCol="0" anchor="ctr"/>
-          <a:lstStyle/>
-          <a:p>
-            <a:pPr algn="ctr"/>
-            <a:endParaRPr lang="en-IN"/>
-          </a:p>
-        </p:txBody>
-      </p:sp>
     </p:spTree>
     <p:extLst>
       <p:ext uri="{BB962C8B-B14F-4D97-AF65-F5344CB8AC3E}">
-        <p14:creationId xmlns:p14="http://schemas.microsoft.com/office/powerpoint/2010/main" val="2012299863"/>
+        <p14:creationId xmlns:p14="http://schemas.microsoft.com/office/powerpoint/2010/main" val="536336935"/>
       </p:ext>
     </p:extLst>
   </p:cSld>

</xml_diff>